<commit_message>
Update Lecture 2 - Binary, Logic, and Logical Operators.pptx
finished negation and added logical AND slides
</commit_message>
<xml_diff>
--- a/wip/Lecture 2 - Binary, Logic, and Logical Operators.pptx
+++ b/wip/Lecture 2 - Binary, Logic, and Logical Operators.pptx
@@ -55,6 +55,18 @@
     <p:sldId id="319" r:id="rId49"/>
     <p:sldId id="320" r:id="rId50"/>
     <p:sldId id="321" r:id="rId51"/>
+    <p:sldId id="322" r:id="rId52"/>
+    <p:sldId id="323" r:id="rId53"/>
+    <p:sldId id="324" r:id="rId54"/>
+    <p:sldId id="325" r:id="rId55"/>
+    <p:sldId id="326" r:id="rId56"/>
+    <p:sldId id="327" r:id="rId57"/>
+    <p:sldId id="328" r:id="rId58"/>
+    <p:sldId id="329" r:id="rId59"/>
+    <p:sldId id="330" r:id="rId60"/>
+    <p:sldId id="331" r:id="rId61"/>
+    <p:sldId id="332" r:id="rId62"/>
+    <p:sldId id="333" r:id="rId63"/>
   </p:sldIdLst>
   <p:sldSz cx="12192000" cy="6858000"/>
   <p:notesSz cx="7772400" cy="10058400"/>
@@ -153,7 +165,245 @@
       </a:defRPr>
     </a:lvl9pPr>
   </p:defaultTextStyle>
+  <p:extLst>
+    <p:ext uri="{EFAFB233-063F-42B5-8137-9DF3F51BA10A}">
+      <p15:sldGuideLst xmlns:p15="http://schemas.microsoft.com/office/powerpoint/2012/main"/>
+    </p:ext>
+  </p:extLst>
 </p:presentation>
+</file>
+
+<file path=ppt/changesInfos/changesInfo1.xml><?xml version="1.0" encoding="utf-8"?>
+<pc:chgInfo xmlns:a="http://schemas.openxmlformats.org/drawingml/2006/main" xmlns:r="http://schemas.openxmlformats.org/officeDocument/2006/relationships" xmlns:ac="http://schemas.microsoft.com/office/drawing/2013/main/command" xmlns:pc="http://schemas.microsoft.com/office/powerpoint/2013/main/command">
+  <pc:docChgLst>
+    <pc:chgData name="Joshua Gross" userId="7bb6a70e-9d37-46e4-96de-748557707bd0" providerId="ADAL" clId="{C93E949C-B07A-44E3-8F7B-B2BCA3D172D8}"/>
+    <pc:docChg chg="custSel addSld modSld">
+      <pc:chgData name="Joshua Gross" userId="7bb6a70e-9d37-46e4-96de-748557707bd0" providerId="ADAL" clId="{C93E949C-B07A-44E3-8F7B-B2BCA3D172D8}" dt="2023-08-23T13:12:39.976" v="1004" actId="20577"/>
+      <pc:docMkLst>
+        <pc:docMk/>
+      </pc:docMkLst>
+      <pc:sldChg chg="addSp modSp">
+        <pc:chgData name="Joshua Gross" userId="7bb6a70e-9d37-46e4-96de-748557707bd0" providerId="ADAL" clId="{C93E949C-B07A-44E3-8F7B-B2BCA3D172D8}" dt="2023-08-23T13:04:01.459" v="30" actId="20577"/>
+        <pc:sldMkLst>
+          <pc:docMk/>
+          <pc:sldMk cId="1312745512" sldId="321"/>
+        </pc:sldMkLst>
+        <pc:spChg chg="mod">
+          <ac:chgData name="Joshua Gross" userId="7bb6a70e-9d37-46e4-96de-748557707bd0" providerId="ADAL" clId="{C93E949C-B07A-44E3-8F7B-B2BCA3D172D8}" dt="2023-08-23T13:03:43.819" v="19" actId="20577"/>
+          <ac:spMkLst>
+            <pc:docMk/>
+            <pc:sldMk cId="1312745512" sldId="321"/>
+            <ac:spMk id="129" creationId="{00000000-0000-0000-0000-000000000000}"/>
+          </ac:spMkLst>
+        </pc:spChg>
+        <pc:graphicFrameChg chg="add mod modGraphic">
+          <ac:chgData name="Joshua Gross" userId="7bb6a70e-9d37-46e4-96de-748557707bd0" providerId="ADAL" clId="{C93E949C-B07A-44E3-8F7B-B2BCA3D172D8}" dt="2023-08-23T13:04:01.459" v="30" actId="20577"/>
+          <ac:graphicFrameMkLst>
+            <pc:docMk/>
+            <pc:sldMk cId="1312745512" sldId="321"/>
+            <ac:graphicFrameMk id="2" creationId="{07EDE641-2CCE-4813-A9D5-1CE49B573743}"/>
+          </ac:graphicFrameMkLst>
+        </pc:graphicFrameChg>
+      </pc:sldChg>
+      <pc:sldChg chg="delSp modSp add">
+        <pc:chgData name="Joshua Gross" userId="7bb6a70e-9d37-46e4-96de-748557707bd0" providerId="ADAL" clId="{C93E949C-B07A-44E3-8F7B-B2BCA3D172D8}" dt="2023-08-23T13:05:12.779" v="244" actId="20577"/>
+        <pc:sldMkLst>
+          <pc:docMk/>
+          <pc:sldMk cId="1626203688" sldId="322"/>
+        </pc:sldMkLst>
+        <pc:spChg chg="mod">
+          <ac:chgData name="Joshua Gross" userId="7bb6a70e-9d37-46e4-96de-748557707bd0" providerId="ADAL" clId="{C93E949C-B07A-44E3-8F7B-B2BCA3D172D8}" dt="2023-08-23T13:05:12.779" v="244" actId="20577"/>
+          <ac:spMkLst>
+            <pc:docMk/>
+            <pc:sldMk cId="1626203688" sldId="322"/>
+            <ac:spMk id="129" creationId="{00000000-0000-0000-0000-000000000000}"/>
+          </ac:spMkLst>
+        </pc:spChg>
+        <pc:graphicFrameChg chg="del">
+          <ac:chgData name="Joshua Gross" userId="7bb6a70e-9d37-46e4-96de-748557707bd0" providerId="ADAL" clId="{C93E949C-B07A-44E3-8F7B-B2BCA3D172D8}" dt="2023-08-23T13:04:09.203" v="32" actId="478"/>
+          <ac:graphicFrameMkLst>
+            <pc:docMk/>
+            <pc:sldMk cId="1626203688" sldId="322"/>
+            <ac:graphicFrameMk id="2" creationId="{07EDE641-2CCE-4813-A9D5-1CE49B573743}"/>
+          </ac:graphicFrameMkLst>
+        </pc:graphicFrameChg>
+      </pc:sldChg>
+      <pc:sldChg chg="modSp add">
+        <pc:chgData name="Joshua Gross" userId="7bb6a70e-9d37-46e4-96de-748557707bd0" providerId="ADAL" clId="{C93E949C-B07A-44E3-8F7B-B2BCA3D172D8}" dt="2023-08-23T13:06:10.937" v="460" actId="20577"/>
+        <pc:sldMkLst>
+          <pc:docMk/>
+          <pc:sldMk cId="2837949777" sldId="323"/>
+        </pc:sldMkLst>
+        <pc:spChg chg="mod">
+          <ac:chgData name="Joshua Gross" userId="7bb6a70e-9d37-46e4-96de-748557707bd0" providerId="ADAL" clId="{C93E949C-B07A-44E3-8F7B-B2BCA3D172D8}" dt="2023-08-23T13:06:10.937" v="460" actId="20577"/>
+          <ac:spMkLst>
+            <pc:docMk/>
+            <pc:sldMk cId="2837949777" sldId="323"/>
+            <ac:spMk id="129" creationId="{00000000-0000-0000-0000-000000000000}"/>
+          </ac:spMkLst>
+        </pc:spChg>
+      </pc:sldChg>
+      <pc:sldChg chg="modSp add">
+        <pc:chgData name="Joshua Gross" userId="7bb6a70e-9d37-46e4-96de-748557707bd0" providerId="ADAL" clId="{C93E949C-B07A-44E3-8F7B-B2BCA3D172D8}" dt="2023-08-23T13:06:27.178" v="512" actId="20577"/>
+        <pc:sldMkLst>
+          <pc:docMk/>
+          <pc:sldMk cId="2050315867" sldId="324"/>
+        </pc:sldMkLst>
+        <pc:spChg chg="mod">
+          <ac:chgData name="Joshua Gross" userId="7bb6a70e-9d37-46e4-96de-748557707bd0" providerId="ADAL" clId="{C93E949C-B07A-44E3-8F7B-B2BCA3D172D8}" dt="2023-08-23T13:06:27.178" v="512" actId="20577"/>
+          <ac:spMkLst>
+            <pc:docMk/>
+            <pc:sldMk cId="2050315867" sldId="324"/>
+            <ac:spMk id="129" creationId="{00000000-0000-0000-0000-000000000000}"/>
+          </ac:spMkLst>
+        </pc:spChg>
+      </pc:sldChg>
+      <pc:sldChg chg="modSp add">
+        <pc:chgData name="Joshua Gross" userId="7bb6a70e-9d37-46e4-96de-748557707bd0" providerId="ADAL" clId="{C93E949C-B07A-44E3-8F7B-B2BCA3D172D8}" dt="2023-08-23T13:06:55.507" v="631" actId="20577"/>
+        <pc:sldMkLst>
+          <pc:docMk/>
+          <pc:sldMk cId="725641330" sldId="325"/>
+        </pc:sldMkLst>
+        <pc:spChg chg="mod">
+          <ac:chgData name="Joshua Gross" userId="7bb6a70e-9d37-46e4-96de-748557707bd0" providerId="ADAL" clId="{C93E949C-B07A-44E3-8F7B-B2BCA3D172D8}" dt="2023-08-23T13:06:55.507" v="631" actId="20577"/>
+          <ac:spMkLst>
+            <pc:docMk/>
+            <pc:sldMk cId="725641330" sldId="325"/>
+            <ac:spMk id="129" creationId="{00000000-0000-0000-0000-000000000000}"/>
+          </ac:spMkLst>
+        </pc:spChg>
+      </pc:sldChg>
+      <pc:sldChg chg="modSp add">
+        <pc:chgData name="Joshua Gross" userId="7bb6a70e-9d37-46e4-96de-748557707bd0" providerId="ADAL" clId="{C93E949C-B07A-44E3-8F7B-B2BCA3D172D8}" dt="2023-08-23T13:07:49.338" v="755" actId="20577"/>
+        <pc:sldMkLst>
+          <pc:docMk/>
+          <pc:sldMk cId="1183966541" sldId="326"/>
+        </pc:sldMkLst>
+        <pc:spChg chg="mod">
+          <ac:chgData name="Joshua Gross" userId="7bb6a70e-9d37-46e4-96de-748557707bd0" providerId="ADAL" clId="{C93E949C-B07A-44E3-8F7B-B2BCA3D172D8}" dt="2023-08-23T13:07:49.338" v="755" actId="20577"/>
+          <ac:spMkLst>
+            <pc:docMk/>
+            <pc:sldMk cId="1183966541" sldId="326"/>
+            <ac:spMk id="129" creationId="{00000000-0000-0000-0000-000000000000}"/>
+          </ac:spMkLst>
+        </pc:spChg>
+      </pc:sldChg>
+      <pc:sldChg chg="modSp add">
+        <pc:chgData name="Joshua Gross" userId="7bb6a70e-9d37-46e4-96de-748557707bd0" providerId="ADAL" clId="{C93E949C-B07A-44E3-8F7B-B2BCA3D172D8}" dt="2023-08-23T13:07:52.746" v="756" actId="20577"/>
+        <pc:sldMkLst>
+          <pc:docMk/>
+          <pc:sldMk cId="1744182384" sldId="327"/>
+        </pc:sldMkLst>
+        <pc:spChg chg="mod">
+          <ac:chgData name="Joshua Gross" userId="7bb6a70e-9d37-46e4-96de-748557707bd0" providerId="ADAL" clId="{C93E949C-B07A-44E3-8F7B-B2BCA3D172D8}" dt="2023-08-23T13:07:52.746" v="756" actId="20577"/>
+          <ac:spMkLst>
+            <pc:docMk/>
+            <pc:sldMk cId="1744182384" sldId="327"/>
+            <ac:spMk id="129" creationId="{00000000-0000-0000-0000-000000000000}"/>
+          </ac:spMkLst>
+        </pc:spChg>
+      </pc:sldChg>
+      <pc:sldChg chg="modSp add">
+        <pc:chgData name="Joshua Gross" userId="7bb6a70e-9d37-46e4-96de-748557707bd0" providerId="ADAL" clId="{C93E949C-B07A-44E3-8F7B-B2BCA3D172D8}" dt="2023-08-23T13:08:01.370" v="776" actId="20577"/>
+        <pc:sldMkLst>
+          <pc:docMk/>
+          <pc:sldMk cId="3318706264" sldId="328"/>
+        </pc:sldMkLst>
+        <pc:spChg chg="mod">
+          <ac:chgData name="Joshua Gross" userId="7bb6a70e-9d37-46e4-96de-748557707bd0" providerId="ADAL" clId="{C93E949C-B07A-44E3-8F7B-B2BCA3D172D8}" dt="2023-08-23T13:08:01.370" v="776" actId="20577"/>
+          <ac:spMkLst>
+            <pc:docMk/>
+            <pc:sldMk cId="3318706264" sldId="328"/>
+            <ac:spMk id="129" creationId="{00000000-0000-0000-0000-000000000000}"/>
+          </ac:spMkLst>
+        </pc:spChg>
+      </pc:sldChg>
+      <pc:sldChg chg="modSp add">
+        <pc:chgData name="Joshua Gross" userId="7bb6a70e-9d37-46e4-96de-748557707bd0" providerId="ADAL" clId="{C93E949C-B07A-44E3-8F7B-B2BCA3D172D8}" dt="2023-08-23T13:08:28.914" v="795" actId="20577"/>
+        <pc:sldMkLst>
+          <pc:docMk/>
+          <pc:sldMk cId="3384979219" sldId="329"/>
+        </pc:sldMkLst>
+        <pc:spChg chg="mod">
+          <ac:chgData name="Joshua Gross" userId="7bb6a70e-9d37-46e4-96de-748557707bd0" providerId="ADAL" clId="{C93E949C-B07A-44E3-8F7B-B2BCA3D172D8}" dt="2023-08-23T13:08:28.914" v="795" actId="20577"/>
+          <ac:spMkLst>
+            <pc:docMk/>
+            <pc:sldMk cId="3384979219" sldId="329"/>
+            <ac:spMk id="129" creationId="{00000000-0000-0000-0000-000000000000}"/>
+          </ac:spMkLst>
+        </pc:spChg>
+      </pc:sldChg>
+      <pc:sldChg chg="modSp add">
+        <pc:chgData name="Joshua Gross" userId="7bb6a70e-9d37-46e4-96de-748557707bd0" providerId="ADAL" clId="{C93E949C-B07A-44E3-8F7B-B2BCA3D172D8}" dt="2023-08-23T13:08:31.833" v="799" actId="20577"/>
+        <pc:sldMkLst>
+          <pc:docMk/>
+          <pc:sldMk cId="2032415397" sldId="330"/>
+        </pc:sldMkLst>
+        <pc:spChg chg="mod">
+          <ac:chgData name="Joshua Gross" userId="7bb6a70e-9d37-46e4-96de-748557707bd0" providerId="ADAL" clId="{C93E949C-B07A-44E3-8F7B-B2BCA3D172D8}" dt="2023-08-23T13:08:31.833" v="799" actId="20577"/>
+          <ac:spMkLst>
+            <pc:docMk/>
+            <pc:sldMk cId="2032415397" sldId="330"/>
+            <ac:spMk id="129" creationId="{00000000-0000-0000-0000-000000000000}"/>
+          </ac:spMkLst>
+        </pc:spChg>
+      </pc:sldChg>
+      <pc:sldChg chg="modSp add">
+        <pc:chgData name="Joshua Gross" userId="7bb6a70e-9d37-46e4-96de-748557707bd0" providerId="ADAL" clId="{C93E949C-B07A-44E3-8F7B-B2BCA3D172D8}" dt="2023-08-23T13:10:14.346" v="871" actId="20577"/>
+        <pc:sldMkLst>
+          <pc:docMk/>
+          <pc:sldMk cId="2052406797" sldId="331"/>
+        </pc:sldMkLst>
+        <pc:spChg chg="mod">
+          <ac:chgData name="Joshua Gross" userId="7bb6a70e-9d37-46e4-96de-748557707bd0" providerId="ADAL" clId="{C93E949C-B07A-44E3-8F7B-B2BCA3D172D8}" dt="2023-08-23T13:10:14.346" v="871" actId="20577"/>
+          <ac:spMkLst>
+            <pc:docMk/>
+            <pc:sldMk cId="2052406797" sldId="331"/>
+            <ac:spMk id="129" creationId="{00000000-0000-0000-0000-000000000000}"/>
+          </ac:spMkLst>
+        </pc:spChg>
+      </pc:sldChg>
+      <pc:sldChg chg="modSp add">
+        <pc:chgData name="Joshua Gross" userId="7bb6a70e-9d37-46e4-96de-748557707bd0" providerId="ADAL" clId="{C93E949C-B07A-44E3-8F7B-B2BCA3D172D8}" dt="2023-08-23T13:10:38.161" v="896" actId="20577"/>
+        <pc:sldMkLst>
+          <pc:docMk/>
+          <pc:sldMk cId="3379362684" sldId="332"/>
+        </pc:sldMkLst>
+        <pc:spChg chg="mod">
+          <ac:chgData name="Joshua Gross" userId="7bb6a70e-9d37-46e4-96de-748557707bd0" providerId="ADAL" clId="{C93E949C-B07A-44E3-8F7B-B2BCA3D172D8}" dt="2023-08-23T13:10:38.161" v="896" actId="20577"/>
+          <ac:spMkLst>
+            <pc:docMk/>
+            <pc:sldMk cId="3379362684" sldId="332"/>
+            <ac:spMk id="129" creationId="{00000000-0000-0000-0000-000000000000}"/>
+          </ac:spMkLst>
+        </pc:spChg>
+      </pc:sldChg>
+      <pc:sldChg chg="addSp modSp add">
+        <pc:chgData name="Joshua Gross" userId="7bb6a70e-9d37-46e4-96de-748557707bd0" providerId="ADAL" clId="{C93E949C-B07A-44E3-8F7B-B2BCA3D172D8}" dt="2023-08-23T13:12:39.976" v="1004" actId="20577"/>
+        <pc:sldMkLst>
+          <pc:docMk/>
+          <pc:sldMk cId="749834321" sldId="333"/>
+        </pc:sldMkLst>
+        <pc:spChg chg="mod">
+          <ac:chgData name="Joshua Gross" userId="7bb6a70e-9d37-46e4-96de-748557707bd0" providerId="ADAL" clId="{C93E949C-B07A-44E3-8F7B-B2BCA3D172D8}" dt="2023-08-23T13:11:43.794" v="972" actId="20577"/>
+          <ac:spMkLst>
+            <pc:docMk/>
+            <pc:sldMk cId="749834321" sldId="333"/>
+            <ac:spMk id="129" creationId="{00000000-0000-0000-0000-000000000000}"/>
+          </ac:spMkLst>
+        </pc:spChg>
+        <pc:graphicFrameChg chg="add mod modGraphic">
+          <ac:chgData name="Joshua Gross" userId="7bb6a70e-9d37-46e4-96de-748557707bd0" providerId="ADAL" clId="{C93E949C-B07A-44E3-8F7B-B2BCA3D172D8}" dt="2023-08-23T13:12:39.976" v="1004" actId="20577"/>
+          <ac:graphicFrameMkLst>
+            <pc:docMk/>
+            <pc:sldMk cId="749834321" sldId="333"/>
+            <ac:graphicFrameMk id="2" creationId="{2EEAC070-88BB-4228-97CB-C0B46B140214}"/>
+          </ac:graphicFrameMkLst>
+        </pc:graphicFrameChg>
+      </pc:sldChg>
+    </pc:docChg>
+  </pc:docChgLst>
+</pc:chgInfo>
 </file>
 
 <file path=ppt/slideLayouts/slideLayout1.xml><?xml version="1.0" encoding="utf-8"?>
@@ -17840,16 +18090,7 @@
                 </a:solidFill>
                 <a:latin typeface="Calibri"/>
               </a:rPr>
-              <a:t>Example: Truth Table </a:t>
-            </a:r>
-            <a:r>
-              <a:rPr lang="en-US" sz="2400" spc="-1">
-                <a:solidFill>
-                  <a:srgbClr val="000000"/>
-                </a:solidFill>
-                <a:latin typeface="Calibri"/>
-              </a:rPr>
-              <a:t>for Negation</a:t>
+              <a:t>Example: Truth Table for Negation (variable A)</a:t>
             </a:r>
           </a:p>
           <a:p>
@@ -17861,6 +18102,39 @@
                 <a:tab pos="0" algn="l"/>
               </a:tabLst>
             </a:pPr>
+            <a:endParaRPr lang="en-US" sz="2400" spc="-1" dirty="0">
+              <a:solidFill>
+                <a:srgbClr val="000000"/>
+              </a:solidFill>
+              <a:latin typeface="Calibri"/>
+            </a:endParaRPr>
+          </a:p>
+          <a:p>
+            <a:pPr indent="0">
+              <a:spcBef>
+                <a:spcPts val="1001"/>
+              </a:spcBef>
+              <a:buNone/>
+              <a:tabLst>
+                <a:tab pos="0" algn="l"/>
+              </a:tabLst>
+            </a:pPr>
+            <a:endParaRPr lang="en-US" sz="2400" spc="-1" dirty="0">
+              <a:solidFill>
+                <a:srgbClr val="000000"/>
+              </a:solidFill>
+              <a:latin typeface="Calibri"/>
+            </a:endParaRPr>
+          </a:p>
+          <a:p>
+            <a:pPr marL="685800" indent="-457200">
+              <a:spcBef>
+                <a:spcPts val="1001"/>
+              </a:spcBef>
+              <a:tabLst>
+                <a:tab pos="0" algn="l"/>
+              </a:tabLst>
+            </a:pPr>
             <a:endParaRPr lang="en-US" sz="2000" spc="-1" dirty="0">
               <a:solidFill>
                 <a:srgbClr val="000000"/>
@@ -17902,6 +18176,161 @@
           </a:p>
         </p:txBody>
       </p:sp>
+      <p:graphicFrame>
+        <p:nvGraphicFramePr>
+          <p:cNvPr id="2" name="Table 1">
+            <a:extLst>
+              <a:ext uri="{FF2B5EF4-FFF2-40B4-BE49-F238E27FC236}">
+                <a16:creationId xmlns:a16="http://schemas.microsoft.com/office/drawing/2014/main" id="{07EDE641-2CCE-4813-A9D5-1CE49B573743}"/>
+              </a:ext>
+            </a:extLst>
+          </p:cNvPr>
+          <p:cNvGraphicFramePr>
+            <a:graphicFrameLocks noGrp="1"/>
+          </p:cNvGraphicFramePr>
+          <p:nvPr>
+            <p:extLst>
+              <p:ext uri="{D42A27DB-BD31-4B8C-83A1-F6EECF244321}">
+                <p14:modId xmlns:p14="http://schemas.microsoft.com/office/powerpoint/2010/main" val="2291254908"/>
+              </p:ext>
+            </p:extLst>
+          </p:nvPr>
+        </p:nvGraphicFramePr>
+        <p:xfrm>
+          <a:off x="2031700" y="3444780"/>
+          <a:ext cx="8128000" cy="1112520"/>
+        </p:xfrm>
+        <a:graphic>
+          <a:graphicData uri="http://schemas.openxmlformats.org/drawingml/2006/table">
+            <a:tbl>
+              <a:tblPr firstRow="1" bandRow="1">
+                <a:tableStyleId>{5940675A-B579-460E-94D1-54222C63F5DA}</a:tableStyleId>
+              </a:tblPr>
+              <a:tblGrid>
+                <a:gridCol w="4064000">
+                  <a:extLst>
+                    <a:ext uri="{9D8B030D-6E8A-4147-A177-3AD203B41FA5}">
+                      <a16:colId xmlns:a16="http://schemas.microsoft.com/office/drawing/2014/main" val="1524975125"/>
+                    </a:ext>
+                  </a:extLst>
+                </a:gridCol>
+                <a:gridCol w="4064000">
+                  <a:extLst>
+                    <a:ext uri="{9D8B030D-6E8A-4147-A177-3AD203B41FA5}">
+                      <a16:colId xmlns:a16="http://schemas.microsoft.com/office/drawing/2014/main" val="834085988"/>
+                    </a:ext>
+                  </a:extLst>
+                </a:gridCol>
+              </a:tblGrid>
+              <a:tr h="370840">
+                <a:tc>
+                  <a:txBody>
+                    <a:bodyPr/>
+                    <a:lstStyle/>
+                    <a:p>
+                      <a:pPr algn="ctr"/>
+                      <a:r>
+                        <a:rPr lang="en-US" dirty="0"/>
+                        <a:t>A</a:t>
+                      </a:r>
+                    </a:p>
+                  </a:txBody>
+                  <a:tcPr/>
+                </a:tc>
+                <a:tc>
+                  <a:txBody>
+                    <a:bodyPr/>
+                    <a:lstStyle/>
+                    <a:p>
+                      <a:pPr algn="ctr"/>
+                      <a:r>
+                        <a:rPr lang="en-US" dirty="0"/>
+                        <a:t>NOT A</a:t>
+                      </a:r>
+                    </a:p>
+                  </a:txBody>
+                  <a:tcPr/>
+                </a:tc>
+                <a:extLst>
+                  <a:ext uri="{0D108BD9-81ED-4DB2-BD59-A6C34878D82A}">
+                    <a16:rowId xmlns:a16="http://schemas.microsoft.com/office/drawing/2014/main" val="1615132924"/>
+                  </a:ext>
+                </a:extLst>
+              </a:tr>
+              <a:tr h="370840">
+                <a:tc>
+                  <a:txBody>
+                    <a:bodyPr/>
+                    <a:lstStyle/>
+                    <a:p>
+                      <a:pPr algn="ctr"/>
+                      <a:r>
+                        <a:rPr lang="en-US" dirty="0"/>
+                        <a:t>0</a:t>
+                      </a:r>
+                    </a:p>
+                  </a:txBody>
+                  <a:tcPr/>
+                </a:tc>
+                <a:tc>
+                  <a:txBody>
+                    <a:bodyPr/>
+                    <a:lstStyle/>
+                    <a:p>
+                      <a:pPr algn="ctr"/>
+                      <a:r>
+                        <a:rPr lang="en-US" dirty="0"/>
+                        <a:t>1</a:t>
+                      </a:r>
+                    </a:p>
+                  </a:txBody>
+                  <a:tcPr/>
+                </a:tc>
+                <a:extLst>
+                  <a:ext uri="{0D108BD9-81ED-4DB2-BD59-A6C34878D82A}">
+                    <a16:rowId xmlns:a16="http://schemas.microsoft.com/office/drawing/2014/main" val="788363946"/>
+                  </a:ext>
+                </a:extLst>
+              </a:tr>
+              <a:tr h="370840">
+                <a:tc>
+                  <a:txBody>
+                    <a:bodyPr/>
+                    <a:lstStyle/>
+                    <a:p>
+                      <a:pPr algn="ctr"/>
+                      <a:r>
+                        <a:rPr lang="en-US" dirty="0"/>
+                        <a:t>1</a:t>
+                      </a:r>
+                    </a:p>
+                  </a:txBody>
+                  <a:tcPr/>
+                </a:tc>
+                <a:tc>
+                  <a:txBody>
+                    <a:bodyPr/>
+                    <a:lstStyle/>
+                    <a:p>
+                      <a:pPr algn="ctr"/>
+                      <a:r>
+                        <a:rPr lang="en-US" dirty="0"/>
+                        <a:t>0</a:t>
+                      </a:r>
+                    </a:p>
+                  </a:txBody>
+                  <a:tcPr/>
+                </a:tc>
+                <a:extLst>
+                  <a:ext uri="{0D108BD9-81ED-4DB2-BD59-A6C34878D82A}">
+                    <a16:rowId xmlns:a16="http://schemas.microsoft.com/office/drawing/2014/main" val="2463671125"/>
+                  </a:ext>
+                </a:extLst>
+              </a:tr>
+            </a:tbl>
+          </a:graphicData>
+        </a:graphic>
+      </p:graphicFrame>
     </p:spTree>
     <p:extLst>
       <p:ext uri="{BB962C8B-B14F-4D97-AF65-F5344CB8AC3E}">
@@ -18173,6 +18602,2347 @@
 </p:sld>
 </file>
 
+<file path=ppt/slides/slide50.xml><?xml version="1.0" encoding="utf-8"?>
+<p:sld xmlns:a="http://schemas.openxmlformats.org/drawingml/2006/main" xmlns:r="http://schemas.openxmlformats.org/officeDocument/2006/relationships" xmlns:p="http://schemas.openxmlformats.org/presentationml/2006/main">
+  <p:cSld>
+    <p:spTree>
+      <p:nvGrpSpPr>
+        <p:cNvPr id="1" name=""/>
+        <p:cNvGrpSpPr/>
+        <p:nvPr/>
+      </p:nvGrpSpPr>
+      <p:grpSpPr>
+        <a:xfrm>
+          <a:off x="0" y="0"/>
+          <a:ext cx="0" cy="0"/>
+          <a:chOff x="0" y="0"/>
+          <a:chExt cx="0" cy="0"/>
+        </a:xfrm>
+      </p:grpSpPr>
+      <p:sp>
+        <p:nvSpPr>
+          <p:cNvPr id="128" name="PlaceHolder 1"/>
+          <p:cNvSpPr>
+            <a:spLocks noGrp="1"/>
+          </p:cNvSpPr>
+          <p:nvPr>
+            <p:ph type="title"/>
+          </p:nvPr>
+        </p:nvSpPr>
+        <p:spPr>
+          <a:xfrm>
+            <a:off x="838080" y="365040"/>
+            <a:ext cx="10515240" cy="1325160"/>
+          </a:xfrm>
+          <a:prstGeom prst="rect">
+            <a:avLst/>
+          </a:prstGeom>
+          <a:noFill/>
+          <a:ln w="0">
+            <a:noFill/>
+          </a:ln>
+        </p:spPr>
+        <p:txBody>
+          <a:bodyPr anchor="ctr">
+            <a:noAutofit/>
+          </a:bodyPr>
+          <a:lstStyle/>
+          <a:p>
+            <a:r>
+              <a:rPr lang="en-US" spc="-1" dirty="0">
+                <a:solidFill>
+                  <a:srgbClr val="000000"/>
+                </a:solidFill>
+                <a:latin typeface="Calibri"/>
+              </a:rPr>
+              <a:t>Logical Operators</a:t>
+            </a:r>
+            <a:endParaRPr lang="en-US" sz="4400" b="0" strike="noStrike" spc="-1" dirty="0">
+              <a:solidFill>
+                <a:srgbClr val="000000"/>
+              </a:solidFill>
+              <a:latin typeface="Calibri"/>
+            </a:endParaRPr>
+          </a:p>
+        </p:txBody>
+      </p:sp>
+      <p:sp>
+        <p:nvSpPr>
+          <p:cNvPr id="129" name="PlaceHolder 2"/>
+          <p:cNvSpPr>
+            <a:spLocks noGrp="1"/>
+          </p:cNvSpPr>
+          <p:nvPr>
+            <p:ph/>
+          </p:nvPr>
+        </p:nvSpPr>
+        <p:spPr>
+          <a:xfrm>
+            <a:off x="838080" y="1825560"/>
+            <a:ext cx="10515240" cy="4350960"/>
+          </a:xfrm>
+          <a:prstGeom prst="rect">
+            <a:avLst/>
+          </a:prstGeom>
+          <a:noFill/>
+          <a:ln w="0">
+            <a:noFill/>
+          </a:ln>
+        </p:spPr>
+        <p:txBody>
+          <a:bodyPr anchor="t">
+            <a:noAutofit/>
+          </a:bodyPr>
+          <a:lstStyle/>
+          <a:p>
+            <a:pPr marL="685800" indent="-457200">
+              <a:spcBef>
+                <a:spcPts val="1001"/>
+              </a:spcBef>
+              <a:tabLst>
+                <a:tab pos="0" algn="l"/>
+              </a:tabLst>
+            </a:pPr>
+            <a:r>
+              <a:rPr lang="en-US" sz="2400" spc="-1" dirty="0">
+                <a:solidFill>
+                  <a:srgbClr val="000000"/>
+                </a:solidFill>
+                <a:latin typeface="Calibri"/>
+              </a:rPr>
+              <a:t>What if you wanted to write something on if the lights were on and a coin was flipped with heads as the result?</a:t>
+            </a:r>
+          </a:p>
+          <a:p>
+            <a:pPr indent="0">
+              <a:spcBef>
+                <a:spcPts val="1001"/>
+              </a:spcBef>
+              <a:buNone/>
+              <a:tabLst>
+                <a:tab pos="0" algn="l"/>
+              </a:tabLst>
+            </a:pPr>
+            <a:endParaRPr lang="en-US" sz="2400" spc="-1" dirty="0">
+              <a:solidFill>
+                <a:srgbClr val="000000"/>
+              </a:solidFill>
+              <a:latin typeface="Calibri"/>
+            </a:endParaRPr>
+          </a:p>
+          <a:p>
+            <a:pPr marL="685800" indent="-457200">
+              <a:spcBef>
+                <a:spcPts val="1001"/>
+              </a:spcBef>
+              <a:tabLst>
+                <a:tab pos="0" algn="l"/>
+              </a:tabLst>
+            </a:pPr>
+            <a:endParaRPr lang="en-US" sz="2000" spc="-1" dirty="0">
+              <a:solidFill>
+                <a:srgbClr val="000000"/>
+              </a:solidFill>
+              <a:latin typeface="Calibri"/>
+            </a:endParaRPr>
+          </a:p>
+          <a:p>
+            <a:pPr marL="685800" indent="-457200">
+              <a:spcBef>
+                <a:spcPts val="1001"/>
+              </a:spcBef>
+              <a:tabLst>
+                <a:tab pos="0" algn="l"/>
+              </a:tabLst>
+            </a:pPr>
+            <a:endParaRPr lang="en-US" sz="2000" b="1" spc="-1" dirty="0">
+              <a:solidFill>
+                <a:srgbClr val="000000"/>
+              </a:solidFill>
+              <a:latin typeface="Calibri"/>
+            </a:endParaRPr>
+          </a:p>
+          <a:p>
+            <a:pPr marL="685800" indent="-457200">
+              <a:spcBef>
+                <a:spcPts val="1001"/>
+              </a:spcBef>
+              <a:tabLst>
+                <a:tab pos="0" algn="l"/>
+              </a:tabLst>
+            </a:pPr>
+            <a:endParaRPr lang="en-US" sz="2400" spc="-1" dirty="0">
+              <a:solidFill>
+                <a:srgbClr val="000000"/>
+              </a:solidFill>
+              <a:latin typeface="Calibri"/>
+            </a:endParaRPr>
+          </a:p>
+        </p:txBody>
+      </p:sp>
+    </p:spTree>
+    <p:extLst>
+      <p:ext uri="{BB962C8B-B14F-4D97-AF65-F5344CB8AC3E}">
+        <p14:creationId xmlns:p14="http://schemas.microsoft.com/office/powerpoint/2010/main" val="1626203688"/>
+      </p:ext>
+    </p:extLst>
+  </p:cSld>
+  <p:clrMapOvr>
+    <a:masterClrMapping/>
+  </p:clrMapOvr>
+</p:sld>
+</file>
+
+<file path=ppt/slides/slide51.xml><?xml version="1.0" encoding="utf-8"?>
+<p:sld xmlns:a="http://schemas.openxmlformats.org/drawingml/2006/main" xmlns:r="http://schemas.openxmlformats.org/officeDocument/2006/relationships" xmlns:p="http://schemas.openxmlformats.org/presentationml/2006/main">
+  <p:cSld>
+    <p:spTree>
+      <p:nvGrpSpPr>
+        <p:cNvPr id="1" name=""/>
+        <p:cNvGrpSpPr/>
+        <p:nvPr/>
+      </p:nvGrpSpPr>
+      <p:grpSpPr>
+        <a:xfrm>
+          <a:off x="0" y="0"/>
+          <a:ext cx="0" cy="0"/>
+          <a:chOff x="0" y="0"/>
+          <a:chExt cx="0" cy="0"/>
+        </a:xfrm>
+      </p:grpSpPr>
+      <p:sp>
+        <p:nvSpPr>
+          <p:cNvPr id="128" name="PlaceHolder 1"/>
+          <p:cNvSpPr>
+            <a:spLocks noGrp="1"/>
+          </p:cNvSpPr>
+          <p:nvPr>
+            <p:ph type="title"/>
+          </p:nvPr>
+        </p:nvSpPr>
+        <p:spPr>
+          <a:xfrm>
+            <a:off x="838080" y="365040"/>
+            <a:ext cx="10515240" cy="1325160"/>
+          </a:xfrm>
+          <a:prstGeom prst="rect">
+            <a:avLst/>
+          </a:prstGeom>
+          <a:noFill/>
+          <a:ln w="0">
+            <a:noFill/>
+          </a:ln>
+        </p:spPr>
+        <p:txBody>
+          <a:bodyPr anchor="ctr">
+            <a:noAutofit/>
+          </a:bodyPr>
+          <a:lstStyle/>
+          <a:p>
+            <a:r>
+              <a:rPr lang="en-US" spc="-1" dirty="0">
+                <a:solidFill>
+                  <a:srgbClr val="000000"/>
+                </a:solidFill>
+                <a:latin typeface="Calibri"/>
+              </a:rPr>
+              <a:t>Logical Operators</a:t>
+            </a:r>
+            <a:endParaRPr lang="en-US" sz="4400" b="0" strike="noStrike" spc="-1" dirty="0">
+              <a:solidFill>
+                <a:srgbClr val="000000"/>
+              </a:solidFill>
+              <a:latin typeface="Calibri"/>
+            </a:endParaRPr>
+          </a:p>
+        </p:txBody>
+      </p:sp>
+      <p:sp>
+        <p:nvSpPr>
+          <p:cNvPr id="129" name="PlaceHolder 2"/>
+          <p:cNvSpPr>
+            <a:spLocks noGrp="1"/>
+          </p:cNvSpPr>
+          <p:nvPr>
+            <p:ph/>
+          </p:nvPr>
+        </p:nvSpPr>
+        <p:spPr>
+          <a:xfrm>
+            <a:off x="838080" y="1825560"/>
+            <a:ext cx="10515240" cy="4350960"/>
+          </a:xfrm>
+          <a:prstGeom prst="rect">
+            <a:avLst/>
+          </a:prstGeom>
+          <a:noFill/>
+          <a:ln w="0">
+            <a:noFill/>
+          </a:ln>
+        </p:spPr>
+        <p:txBody>
+          <a:bodyPr anchor="t">
+            <a:noAutofit/>
+          </a:bodyPr>
+          <a:lstStyle/>
+          <a:p>
+            <a:pPr marL="685800" indent="-457200">
+              <a:spcBef>
+                <a:spcPts val="1001"/>
+              </a:spcBef>
+              <a:tabLst>
+                <a:tab pos="0" algn="l"/>
+              </a:tabLst>
+            </a:pPr>
+            <a:r>
+              <a:rPr lang="en-US" sz="2400" spc="-1" dirty="0">
+                <a:solidFill>
+                  <a:srgbClr val="000000"/>
+                </a:solidFill>
+                <a:latin typeface="Calibri"/>
+              </a:rPr>
+              <a:t>What if you wanted to write something on if the lights were on and a coin was flipped with heads as the result?</a:t>
+            </a:r>
+          </a:p>
+          <a:p>
+            <a:pPr marL="1143000" lvl="1" indent="-457200">
+              <a:spcBef>
+                <a:spcPts val="1001"/>
+              </a:spcBef>
+              <a:tabLst>
+                <a:tab pos="0" algn="l"/>
+              </a:tabLst>
+            </a:pPr>
+            <a:r>
+              <a:rPr lang="en-US" sz="2000" spc="-1" dirty="0">
+                <a:solidFill>
+                  <a:srgbClr val="000000"/>
+                </a:solidFill>
+                <a:latin typeface="Calibri"/>
+              </a:rPr>
+              <a:t>The natural language answer would be: “if the lights are on </a:t>
+            </a:r>
+            <a:r>
+              <a:rPr lang="en-US" sz="2000" b="1" spc="-1" dirty="0">
+                <a:solidFill>
+                  <a:srgbClr val="000000"/>
+                </a:solidFill>
+                <a:latin typeface="Calibri"/>
+              </a:rPr>
+              <a:t>and </a:t>
+            </a:r>
+            <a:r>
+              <a:rPr lang="en-US" sz="2000" spc="-1" dirty="0">
+                <a:solidFill>
+                  <a:srgbClr val="000000"/>
+                </a:solidFill>
+                <a:latin typeface="Calibri"/>
+              </a:rPr>
+              <a:t>a coin is flipped that lands on heads, then you can write (with the nib out)”</a:t>
+            </a:r>
+          </a:p>
+          <a:p>
+            <a:pPr indent="0">
+              <a:spcBef>
+                <a:spcPts val="1001"/>
+              </a:spcBef>
+              <a:buNone/>
+              <a:tabLst>
+                <a:tab pos="0" algn="l"/>
+              </a:tabLst>
+            </a:pPr>
+            <a:endParaRPr lang="en-US" sz="2400" spc="-1" dirty="0">
+              <a:solidFill>
+                <a:srgbClr val="000000"/>
+              </a:solidFill>
+              <a:latin typeface="Calibri"/>
+            </a:endParaRPr>
+          </a:p>
+          <a:p>
+            <a:pPr marL="685800" indent="-457200">
+              <a:spcBef>
+                <a:spcPts val="1001"/>
+              </a:spcBef>
+              <a:tabLst>
+                <a:tab pos="0" algn="l"/>
+              </a:tabLst>
+            </a:pPr>
+            <a:endParaRPr lang="en-US" sz="2000" spc="-1" dirty="0">
+              <a:solidFill>
+                <a:srgbClr val="000000"/>
+              </a:solidFill>
+              <a:latin typeface="Calibri"/>
+            </a:endParaRPr>
+          </a:p>
+          <a:p>
+            <a:pPr marL="685800" indent="-457200">
+              <a:spcBef>
+                <a:spcPts val="1001"/>
+              </a:spcBef>
+              <a:tabLst>
+                <a:tab pos="0" algn="l"/>
+              </a:tabLst>
+            </a:pPr>
+            <a:endParaRPr lang="en-US" sz="2000" b="1" spc="-1" dirty="0">
+              <a:solidFill>
+                <a:srgbClr val="000000"/>
+              </a:solidFill>
+              <a:latin typeface="Calibri"/>
+            </a:endParaRPr>
+          </a:p>
+          <a:p>
+            <a:pPr marL="685800" indent="-457200">
+              <a:spcBef>
+                <a:spcPts val="1001"/>
+              </a:spcBef>
+              <a:tabLst>
+                <a:tab pos="0" algn="l"/>
+              </a:tabLst>
+            </a:pPr>
+            <a:endParaRPr lang="en-US" sz="2400" spc="-1" dirty="0">
+              <a:solidFill>
+                <a:srgbClr val="000000"/>
+              </a:solidFill>
+              <a:latin typeface="Calibri"/>
+            </a:endParaRPr>
+          </a:p>
+        </p:txBody>
+      </p:sp>
+    </p:spTree>
+    <p:extLst>
+      <p:ext uri="{BB962C8B-B14F-4D97-AF65-F5344CB8AC3E}">
+        <p14:creationId xmlns:p14="http://schemas.microsoft.com/office/powerpoint/2010/main" val="2837949777"/>
+      </p:ext>
+    </p:extLst>
+  </p:cSld>
+  <p:clrMapOvr>
+    <a:masterClrMapping/>
+  </p:clrMapOvr>
+</p:sld>
+</file>
+
+<file path=ppt/slides/slide52.xml><?xml version="1.0" encoding="utf-8"?>
+<p:sld xmlns:a="http://schemas.openxmlformats.org/drawingml/2006/main" xmlns:r="http://schemas.openxmlformats.org/officeDocument/2006/relationships" xmlns:p="http://schemas.openxmlformats.org/presentationml/2006/main">
+  <p:cSld>
+    <p:spTree>
+      <p:nvGrpSpPr>
+        <p:cNvPr id="1" name=""/>
+        <p:cNvGrpSpPr/>
+        <p:nvPr/>
+      </p:nvGrpSpPr>
+      <p:grpSpPr>
+        <a:xfrm>
+          <a:off x="0" y="0"/>
+          <a:ext cx="0" cy="0"/>
+          <a:chOff x="0" y="0"/>
+          <a:chExt cx="0" cy="0"/>
+        </a:xfrm>
+      </p:grpSpPr>
+      <p:sp>
+        <p:nvSpPr>
+          <p:cNvPr id="128" name="PlaceHolder 1"/>
+          <p:cNvSpPr>
+            <a:spLocks noGrp="1"/>
+          </p:cNvSpPr>
+          <p:nvPr>
+            <p:ph type="title"/>
+          </p:nvPr>
+        </p:nvSpPr>
+        <p:spPr>
+          <a:xfrm>
+            <a:off x="838080" y="365040"/>
+            <a:ext cx="10515240" cy="1325160"/>
+          </a:xfrm>
+          <a:prstGeom prst="rect">
+            <a:avLst/>
+          </a:prstGeom>
+          <a:noFill/>
+          <a:ln w="0">
+            <a:noFill/>
+          </a:ln>
+        </p:spPr>
+        <p:txBody>
+          <a:bodyPr anchor="ctr">
+            <a:noAutofit/>
+          </a:bodyPr>
+          <a:lstStyle/>
+          <a:p>
+            <a:r>
+              <a:rPr lang="en-US" spc="-1" dirty="0">
+                <a:solidFill>
+                  <a:srgbClr val="000000"/>
+                </a:solidFill>
+                <a:latin typeface="Calibri"/>
+              </a:rPr>
+              <a:t>Logical Operators</a:t>
+            </a:r>
+            <a:endParaRPr lang="en-US" sz="4400" b="0" strike="noStrike" spc="-1" dirty="0">
+              <a:solidFill>
+                <a:srgbClr val="000000"/>
+              </a:solidFill>
+              <a:latin typeface="Calibri"/>
+            </a:endParaRPr>
+          </a:p>
+        </p:txBody>
+      </p:sp>
+      <p:sp>
+        <p:nvSpPr>
+          <p:cNvPr id="129" name="PlaceHolder 2"/>
+          <p:cNvSpPr>
+            <a:spLocks noGrp="1"/>
+          </p:cNvSpPr>
+          <p:nvPr>
+            <p:ph/>
+          </p:nvPr>
+        </p:nvSpPr>
+        <p:spPr>
+          <a:xfrm>
+            <a:off x="838080" y="1825560"/>
+            <a:ext cx="10515240" cy="4350960"/>
+          </a:xfrm>
+          <a:prstGeom prst="rect">
+            <a:avLst/>
+          </a:prstGeom>
+          <a:noFill/>
+          <a:ln w="0">
+            <a:noFill/>
+          </a:ln>
+        </p:spPr>
+        <p:txBody>
+          <a:bodyPr anchor="t">
+            <a:noAutofit/>
+          </a:bodyPr>
+          <a:lstStyle/>
+          <a:p>
+            <a:pPr marL="685800" indent="-457200">
+              <a:spcBef>
+                <a:spcPts val="1001"/>
+              </a:spcBef>
+              <a:tabLst>
+                <a:tab pos="0" algn="l"/>
+              </a:tabLst>
+            </a:pPr>
+            <a:r>
+              <a:rPr lang="en-US" sz="2400" spc="-1" dirty="0">
+                <a:solidFill>
+                  <a:srgbClr val="000000"/>
+                </a:solidFill>
+                <a:latin typeface="Calibri"/>
+              </a:rPr>
+              <a:t>What if you wanted to write something on if the lights were on and a coin was flipped with heads as the result?</a:t>
+            </a:r>
+          </a:p>
+          <a:p>
+            <a:pPr marL="1143000" lvl="1" indent="-457200">
+              <a:spcBef>
+                <a:spcPts val="1001"/>
+              </a:spcBef>
+              <a:tabLst>
+                <a:tab pos="0" algn="l"/>
+              </a:tabLst>
+            </a:pPr>
+            <a:r>
+              <a:rPr lang="en-US" sz="2000" spc="-1" dirty="0">
+                <a:solidFill>
+                  <a:srgbClr val="000000"/>
+                </a:solidFill>
+                <a:latin typeface="Calibri"/>
+              </a:rPr>
+              <a:t>The natural language answer would be: “if the lights are on </a:t>
+            </a:r>
+            <a:r>
+              <a:rPr lang="en-US" sz="2000" b="1" spc="-1" dirty="0">
+                <a:solidFill>
+                  <a:srgbClr val="000000"/>
+                </a:solidFill>
+                <a:latin typeface="Calibri"/>
+              </a:rPr>
+              <a:t>and </a:t>
+            </a:r>
+            <a:r>
+              <a:rPr lang="en-US" sz="2000" spc="-1" dirty="0">
+                <a:solidFill>
+                  <a:srgbClr val="000000"/>
+                </a:solidFill>
+                <a:latin typeface="Calibri"/>
+              </a:rPr>
+              <a:t>a coin is flipped that lands on heads, then you can write (with the nib out)”</a:t>
+            </a:r>
+          </a:p>
+          <a:p>
+            <a:pPr marL="685800" indent="-457200">
+              <a:spcBef>
+                <a:spcPts val="1001"/>
+              </a:spcBef>
+              <a:tabLst>
+                <a:tab pos="0" algn="l"/>
+              </a:tabLst>
+            </a:pPr>
+            <a:r>
+              <a:rPr lang="en-US" sz="2400" spc="-1" dirty="0">
+                <a:solidFill>
+                  <a:srgbClr val="000000"/>
+                </a:solidFill>
+                <a:latin typeface="Calibri"/>
+              </a:rPr>
+              <a:t>This brings us to the next logical operator, </a:t>
+            </a:r>
+            <a:r>
+              <a:rPr lang="en-US" sz="2400" b="1" spc="-1" dirty="0">
+                <a:solidFill>
+                  <a:srgbClr val="000000"/>
+                </a:solidFill>
+                <a:latin typeface="Calibri"/>
+              </a:rPr>
+              <a:t>AND</a:t>
+            </a:r>
+            <a:r>
+              <a:rPr lang="en-US" sz="2400" spc="-1" dirty="0">
+                <a:solidFill>
+                  <a:srgbClr val="000000"/>
+                </a:solidFill>
+                <a:latin typeface="Calibri"/>
+              </a:rPr>
+              <a:t>.</a:t>
+            </a:r>
+          </a:p>
+          <a:p>
+            <a:pPr indent="0">
+              <a:spcBef>
+                <a:spcPts val="1001"/>
+              </a:spcBef>
+              <a:buNone/>
+              <a:tabLst>
+                <a:tab pos="0" algn="l"/>
+              </a:tabLst>
+            </a:pPr>
+            <a:endParaRPr lang="en-US" sz="2400" spc="-1" dirty="0">
+              <a:solidFill>
+                <a:srgbClr val="000000"/>
+              </a:solidFill>
+              <a:latin typeface="Calibri"/>
+            </a:endParaRPr>
+          </a:p>
+          <a:p>
+            <a:pPr marL="685800" indent="-457200">
+              <a:spcBef>
+                <a:spcPts val="1001"/>
+              </a:spcBef>
+              <a:tabLst>
+                <a:tab pos="0" algn="l"/>
+              </a:tabLst>
+            </a:pPr>
+            <a:endParaRPr lang="en-US" sz="2000" spc="-1" dirty="0">
+              <a:solidFill>
+                <a:srgbClr val="000000"/>
+              </a:solidFill>
+              <a:latin typeface="Calibri"/>
+            </a:endParaRPr>
+          </a:p>
+          <a:p>
+            <a:pPr marL="685800" indent="-457200">
+              <a:spcBef>
+                <a:spcPts val="1001"/>
+              </a:spcBef>
+              <a:tabLst>
+                <a:tab pos="0" algn="l"/>
+              </a:tabLst>
+            </a:pPr>
+            <a:endParaRPr lang="en-US" sz="2000" b="1" spc="-1" dirty="0">
+              <a:solidFill>
+                <a:srgbClr val="000000"/>
+              </a:solidFill>
+              <a:latin typeface="Calibri"/>
+            </a:endParaRPr>
+          </a:p>
+          <a:p>
+            <a:pPr marL="685800" indent="-457200">
+              <a:spcBef>
+                <a:spcPts val="1001"/>
+              </a:spcBef>
+              <a:tabLst>
+                <a:tab pos="0" algn="l"/>
+              </a:tabLst>
+            </a:pPr>
+            <a:endParaRPr lang="en-US" sz="2400" spc="-1" dirty="0">
+              <a:solidFill>
+                <a:srgbClr val="000000"/>
+              </a:solidFill>
+              <a:latin typeface="Calibri"/>
+            </a:endParaRPr>
+          </a:p>
+        </p:txBody>
+      </p:sp>
+    </p:spTree>
+    <p:extLst>
+      <p:ext uri="{BB962C8B-B14F-4D97-AF65-F5344CB8AC3E}">
+        <p14:creationId xmlns:p14="http://schemas.microsoft.com/office/powerpoint/2010/main" val="2050315867"/>
+      </p:ext>
+    </p:extLst>
+  </p:cSld>
+  <p:clrMapOvr>
+    <a:masterClrMapping/>
+  </p:clrMapOvr>
+</p:sld>
+</file>
+
+<file path=ppt/slides/slide53.xml><?xml version="1.0" encoding="utf-8"?>
+<p:sld xmlns:a="http://schemas.openxmlformats.org/drawingml/2006/main" xmlns:r="http://schemas.openxmlformats.org/officeDocument/2006/relationships" xmlns:p="http://schemas.openxmlformats.org/presentationml/2006/main">
+  <p:cSld>
+    <p:spTree>
+      <p:nvGrpSpPr>
+        <p:cNvPr id="1" name=""/>
+        <p:cNvGrpSpPr/>
+        <p:nvPr/>
+      </p:nvGrpSpPr>
+      <p:grpSpPr>
+        <a:xfrm>
+          <a:off x="0" y="0"/>
+          <a:ext cx="0" cy="0"/>
+          <a:chOff x="0" y="0"/>
+          <a:chExt cx="0" cy="0"/>
+        </a:xfrm>
+      </p:grpSpPr>
+      <p:sp>
+        <p:nvSpPr>
+          <p:cNvPr id="128" name="PlaceHolder 1"/>
+          <p:cNvSpPr>
+            <a:spLocks noGrp="1"/>
+          </p:cNvSpPr>
+          <p:nvPr>
+            <p:ph type="title"/>
+          </p:nvPr>
+        </p:nvSpPr>
+        <p:spPr>
+          <a:xfrm>
+            <a:off x="838080" y="365040"/>
+            <a:ext cx="10515240" cy="1325160"/>
+          </a:xfrm>
+          <a:prstGeom prst="rect">
+            <a:avLst/>
+          </a:prstGeom>
+          <a:noFill/>
+          <a:ln w="0">
+            <a:noFill/>
+          </a:ln>
+        </p:spPr>
+        <p:txBody>
+          <a:bodyPr anchor="ctr">
+            <a:noAutofit/>
+          </a:bodyPr>
+          <a:lstStyle/>
+          <a:p>
+            <a:r>
+              <a:rPr lang="en-US" spc="-1" dirty="0">
+                <a:solidFill>
+                  <a:srgbClr val="000000"/>
+                </a:solidFill>
+                <a:latin typeface="Calibri"/>
+              </a:rPr>
+              <a:t>Logical Operators</a:t>
+            </a:r>
+            <a:endParaRPr lang="en-US" sz="4400" b="0" strike="noStrike" spc="-1" dirty="0">
+              <a:solidFill>
+                <a:srgbClr val="000000"/>
+              </a:solidFill>
+              <a:latin typeface="Calibri"/>
+            </a:endParaRPr>
+          </a:p>
+        </p:txBody>
+      </p:sp>
+      <p:sp>
+        <p:nvSpPr>
+          <p:cNvPr id="129" name="PlaceHolder 2"/>
+          <p:cNvSpPr>
+            <a:spLocks noGrp="1"/>
+          </p:cNvSpPr>
+          <p:nvPr>
+            <p:ph/>
+          </p:nvPr>
+        </p:nvSpPr>
+        <p:spPr>
+          <a:xfrm>
+            <a:off x="838080" y="1825560"/>
+            <a:ext cx="10515240" cy="4350960"/>
+          </a:xfrm>
+          <a:prstGeom prst="rect">
+            <a:avLst/>
+          </a:prstGeom>
+          <a:noFill/>
+          <a:ln w="0">
+            <a:noFill/>
+          </a:ln>
+        </p:spPr>
+        <p:txBody>
+          <a:bodyPr anchor="t">
+            <a:noAutofit/>
+          </a:bodyPr>
+          <a:lstStyle/>
+          <a:p>
+            <a:pPr marL="685800" indent="-457200">
+              <a:spcBef>
+                <a:spcPts val="1001"/>
+              </a:spcBef>
+              <a:tabLst>
+                <a:tab pos="0" algn="l"/>
+              </a:tabLst>
+            </a:pPr>
+            <a:r>
+              <a:rPr lang="en-US" sz="2400" b="1" spc="-1" dirty="0">
+                <a:solidFill>
+                  <a:srgbClr val="000000"/>
+                </a:solidFill>
+                <a:latin typeface="Calibri"/>
+              </a:rPr>
+              <a:t>AND </a:t>
+            </a:r>
+            <a:r>
+              <a:rPr lang="en-US" sz="2400" spc="-1" dirty="0">
+                <a:solidFill>
+                  <a:srgbClr val="000000"/>
+                </a:solidFill>
+                <a:latin typeface="Calibri"/>
+              </a:rPr>
+              <a:t>– acts on two variables, and is only true when both variables are true</a:t>
+            </a:r>
+          </a:p>
+          <a:p>
+            <a:pPr indent="0">
+              <a:spcBef>
+                <a:spcPts val="1001"/>
+              </a:spcBef>
+              <a:buNone/>
+              <a:tabLst>
+                <a:tab pos="0" algn="l"/>
+              </a:tabLst>
+            </a:pPr>
+            <a:endParaRPr lang="en-US" sz="2400" spc="-1" dirty="0">
+              <a:solidFill>
+                <a:srgbClr val="000000"/>
+              </a:solidFill>
+              <a:latin typeface="Calibri"/>
+            </a:endParaRPr>
+          </a:p>
+          <a:p>
+            <a:pPr indent="0">
+              <a:spcBef>
+                <a:spcPts val="1001"/>
+              </a:spcBef>
+              <a:buNone/>
+              <a:tabLst>
+                <a:tab pos="0" algn="l"/>
+              </a:tabLst>
+            </a:pPr>
+            <a:endParaRPr lang="en-US" sz="2400" spc="-1" dirty="0">
+              <a:solidFill>
+                <a:srgbClr val="000000"/>
+              </a:solidFill>
+              <a:latin typeface="Calibri"/>
+            </a:endParaRPr>
+          </a:p>
+          <a:p>
+            <a:pPr marL="685800" indent="-457200">
+              <a:spcBef>
+                <a:spcPts val="1001"/>
+              </a:spcBef>
+              <a:tabLst>
+                <a:tab pos="0" algn="l"/>
+              </a:tabLst>
+            </a:pPr>
+            <a:endParaRPr lang="en-US" sz="2000" spc="-1" dirty="0">
+              <a:solidFill>
+                <a:srgbClr val="000000"/>
+              </a:solidFill>
+              <a:latin typeface="Calibri"/>
+            </a:endParaRPr>
+          </a:p>
+          <a:p>
+            <a:pPr marL="685800" indent="-457200">
+              <a:spcBef>
+                <a:spcPts val="1001"/>
+              </a:spcBef>
+              <a:tabLst>
+                <a:tab pos="0" algn="l"/>
+              </a:tabLst>
+            </a:pPr>
+            <a:endParaRPr lang="en-US" sz="2000" b="1" spc="-1" dirty="0">
+              <a:solidFill>
+                <a:srgbClr val="000000"/>
+              </a:solidFill>
+              <a:latin typeface="Calibri"/>
+            </a:endParaRPr>
+          </a:p>
+          <a:p>
+            <a:pPr marL="685800" indent="-457200">
+              <a:spcBef>
+                <a:spcPts val="1001"/>
+              </a:spcBef>
+              <a:tabLst>
+                <a:tab pos="0" algn="l"/>
+              </a:tabLst>
+            </a:pPr>
+            <a:endParaRPr lang="en-US" sz="2400" spc="-1" dirty="0">
+              <a:solidFill>
+                <a:srgbClr val="000000"/>
+              </a:solidFill>
+              <a:latin typeface="Calibri"/>
+            </a:endParaRPr>
+          </a:p>
+        </p:txBody>
+      </p:sp>
+    </p:spTree>
+    <p:extLst>
+      <p:ext uri="{BB962C8B-B14F-4D97-AF65-F5344CB8AC3E}">
+        <p14:creationId xmlns:p14="http://schemas.microsoft.com/office/powerpoint/2010/main" val="725641330"/>
+      </p:ext>
+    </p:extLst>
+  </p:cSld>
+  <p:clrMapOvr>
+    <a:masterClrMapping/>
+  </p:clrMapOvr>
+</p:sld>
+</file>
+
+<file path=ppt/slides/slide54.xml><?xml version="1.0" encoding="utf-8"?>
+<p:sld xmlns:a="http://schemas.openxmlformats.org/drawingml/2006/main" xmlns:r="http://schemas.openxmlformats.org/officeDocument/2006/relationships" xmlns:p="http://schemas.openxmlformats.org/presentationml/2006/main">
+  <p:cSld>
+    <p:spTree>
+      <p:nvGrpSpPr>
+        <p:cNvPr id="1" name=""/>
+        <p:cNvGrpSpPr/>
+        <p:nvPr/>
+      </p:nvGrpSpPr>
+      <p:grpSpPr>
+        <a:xfrm>
+          <a:off x="0" y="0"/>
+          <a:ext cx="0" cy="0"/>
+          <a:chOff x="0" y="0"/>
+          <a:chExt cx="0" cy="0"/>
+        </a:xfrm>
+      </p:grpSpPr>
+      <p:sp>
+        <p:nvSpPr>
+          <p:cNvPr id="128" name="PlaceHolder 1"/>
+          <p:cNvSpPr>
+            <a:spLocks noGrp="1"/>
+          </p:cNvSpPr>
+          <p:nvPr>
+            <p:ph type="title"/>
+          </p:nvPr>
+        </p:nvSpPr>
+        <p:spPr>
+          <a:xfrm>
+            <a:off x="838080" y="365040"/>
+            <a:ext cx="10515240" cy="1325160"/>
+          </a:xfrm>
+          <a:prstGeom prst="rect">
+            <a:avLst/>
+          </a:prstGeom>
+          <a:noFill/>
+          <a:ln w="0">
+            <a:noFill/>
+          </a:ln>
+        </p:spPr>
+        <p:txBody>
+          <a:bodyPr anchor="ctr">
+            <a:noAutofit/>
+          </a:bodyPr>
+          <a:lstStyle/>
+          <a:p>
+            <a:r>
+              <a:rPr lang="en-US" spc="-1" dirty="0">
+                <a:solidFill>
+                  <a:srgbClr val="000000"/>
+                </a:solidFill>
+                <a:latin typeface="Calibri"/>
+              </a:rPr>
+              <a:t>Logical Operators</a:t>
+            </a:r>
+            <a:endParaRPr lang="en-US" sz="4400" b="0" strike="noStrike" spc="-1" dirty="0">
+              <a:solidFill>
+                <a:srgbClr val="000000"/>
+              </a:solidFill>
+              <a:latin typeface="Calibri"/>
+            </a:endParaRPr>
+          </a:p>
+        </p:txBody>
+      </p:sp>
+      <p:sp>
+        <p:nvSpPr>
+          <p:cNvPr id="129" name="PlaceHolder 2"/>
+          <p:cNvSpPr>
+            <a:spLocks noGrp="1"/>
+          </p:cNvSpPr>
+          <p:nvPr>
+            <p:ph/>
+          </p:nvPr>
+        </p:nvSpPr>
+        <p:spPr>
+          <a:xfrm>
+            <a:off x="838080" y="1825560"/>
+            <a:ext cx="10515240" cy="4350960"/>
+          </a:xfrm>
+          <a:prstGeom prst="rect">
+            <a:avLst/>
+          </a:prstGeom>
+          <a:noFill/>
+          <a:ln w="0">
+            <a:noFill/>
+          </a:ln>
+        </p:spPr>
+        <p:txBody>
+          <a:bodyPr anchor="t">
+            <a:noAutofit/>
+          </a:bodyPr>
+          <a:lstStyle/>
+          <a:p>
+            <a:pPr marL="685800" indent="-457200">
+              <a:spcBef>
+                <a:spcPts val="1001"/>
+              </a:spcBef>
+              <a:tabLst>
+                <a:tab pos="0" algn="l"/>
+              </a:tabLst>
+            </a:pPr>
+            <a:r>
+              <a:rPr lang="en-US" sz="2400" b="1" spc="-1" dirty="0">
+                <a:solidFill>
+                  <a:srgbClr val="000000"/>
+                </a:solidFill>
+                <a:latin typeface="Calibri"/>
+              </a:rPr>
+              <a:t>AND </a:t>
+            </a:r>
+            <a:r>
+              <a:rPr lang="en-US" sz="2400" spc="-1" dirty="0">
+                <a:solidFill>
+                  <a:srgbClr val="000000"/>
+                </a:solidFill>
+                <a:latin typeface="Calibri"/>
+              </a:rPr>
+              <a:t>– acts on two variables, and is only true when both variables are true</a:t>
+            </a:r>
+          </a:p>
+          <a:p>
+            <a:pPr marL="685800" indent="-457200">
+              <a:spcBef>
+                <a:spcPts val="1001"/>
+              </a:spcBef>
+              <a:tabLst>
+                <a:tab pos="0" algn="l"/>
+              </a:tabLst>
+            </a:pPr>
+            <a:r>
+              <a:rPr lang="en-US" sz="2400" spc="-1" dirty="0">
+                <a:solidFill>
+                  <a:srgbClr val="000000"/>
+                </a:solidFill>
+                <a:latin typeface="Calibri"/>
+              </a:rPr>
+              <a:t>Example: Lights on and heads flipped = 1 AND 1</a:t>
+            </a:r>
+          </a:p>
+          <a:p>
+            <a:pPr indent="0">
+              <a:spcBef>
+                <a:spcPts val="1001"/>
+              </a:spcBef>
+              <a:buNone/>
+              <a:tabLst>
+                <a:tab pos="0" algn="l"/>
+              </a:tabLst>
+            </a:pPr>
+            <a:endParaRPr lang="en-US" sz="2400" spc="-1" dirty="0">
+              <a:solidFill>
+                <a:srgbClr val="000000"/>
+              </a:solidFill>
+              <a:latin typeface="Calibri"/>
+            </a:endParaRPr>
+          </a:p>
+          <a:p>
+            <a:pPr marL="685800" indent="-457200">
+              <a:spcBef>
+                <a:spcPts val="1001"/>
+              </a:spcBef>
+              <a:tabLst>
+                <a:tab pos="0" algn="l"/>
+              </a:tabLst>
+            </a:pPr>
+            <a:endParaRPr lang="en-US" sz="2000" spc="-1" dirty="0">
+              <a:solidFill>
+                <a:srgbClr val="000000"/>
+              </a:solidFill>
+              <a:latin typeface="Calibri"/>
+            </a:endParaRPr>
+          </a:p>
+          <a:p>
+            <a:pPr marL="685800" indent="-457200">
+              <a:spcBef>
+                <a:spcPts val="1001"/>
+              </a:spcBef>
+              <a:tabLst>
+                <a:tab pos="0" algn="l"/>
+              </a:tabLst>
+            </a:pPr>
+            <a:endParaRPr lang="en-US" sz="2000" b="1" spc="-1" dirty="0">
+              <a:solidFill>
+                <a:srgbClr val="000000"/>
+              </a:solidFill>
+              <a:latin typeface="Calibri"/>
+            </a:endParaRPr>
+          </a:p>
+          <a:p>
+            <a:pPr marL="685800" indent="-457200">
+              <a:spcBef>
+                <a:spcPts val="1001"/>
+              </a:spcBef>
+              <a:tabLst>
+                <a:tab pos="0" algn="l"/>
+              </a:tabLst>
+            </a:pPr>
+            <a:endParaRPr lang="en-US" sz="2400" spc="-1" dirty="0">
+              <a:solidFill>
+                <a:srgbClr val="000000"/>
+              </a:solidFill>
+              <a:latin typeface="Calibri"/>
+            </a:endParaRPr>
+          </a:p>
+        </p:txBody>
+      </p:sp>
+    </p:spTree>
+    <p:extLst>
+      <p:ext uri="{BB962C8B-B14F-4D97-AF65-F5344CB8AC3E}">
+        <p14:creationId xmlns:p14="http://schemas.microsoft.com/office/powerpoint/2010/main" val="1183966541"/>
+      </p:ext>
+    </p:extLst>
+  </p:cSld>
+  <p:clrMapOvr>
+    <a:masterClrMapping/>
+  </p:clrMapOvr>
+</p:sld>
+</file>
+
+<file path=ppt/slides/slide55.xml><?xml version="1.0" encoding="utf-8"?>
+<p:sld xmlns:a="http://schemas.openxmlformats.org/drawingml/2006/main" xmlns:r="http://schemas.openxmlformats.org/officeDocument/2006/relationships" xmlns:p="http://schemas.openxmlformats.org/presentationml/2006/main">
+  <p:cSld>
+    <p:spTree>
+      <p:nvGrpSpPr>
+        <p:cNvPr id="1" name=""/>
+        <p:cNvGrpSpPr/>
+        <p:nvPr/>
+      </p:nvGrpSpPr>
+      <p:grpSpPr>
+        <a:xfrm>
+          <a:off x="0" y="0"/>
+          <a:ext cx="0" cy="0"/>
+          <a:chOff x="0" y="0"/>
+          <a:chExt cx="0" cy="0"/>
+        </a:xfrm>
+      </p:grpSpPr>
+      <p:sp>
+        <p:nvSpPr>
+          <p:cNvPr id="128" name="PlaceHolder 1"/>
+          <p:cNvSpPr>
+            <a:spLocks noGrp="1"/>
+          </p:cNvSpPr>
+          <p:nvPr>
+            <p:ph type="title"/>
+          </p:nvPr>
+        </p:nvSpPr>
+        <p:spPr>
+          <a:xfrm>
+            <a:off x="838080" y="365040"/>
+            <a:ext cx="10515240" cy="1325160"/>
+          </a:xfrm>
+          <a:prstGeom prst="rect">
+            <a:avLst/>
+          </a:prstGeom>
+          <a:noFill/>
+          <a:ln w="0">
+            <a:noFill/>
+          </a:ln>
+        </p:spPr>
+        <p:txBody>
+          <a:bodyPr anchor="ctr">
+            <a:noAutofit/>
+          </a:bodyPr>
+          <a:lstStyle/>
+          <a:p>
+            <a:r>
+              <a:rPr lang="en-US" spc="-1" dirty="0">
+                <a:solidFill>
+                  <a:srgbClr val="000000"/>
+                </a:solidFill>
+                <a:latin typeface="Calibri"/>
+              </a:rPr>
+              <a:t>Logical Operators</a:t>
+            </a:r>
+            <a:endParaRPr lang="en-US" sz="4400" b="0" strike="noStrike" spc="-1" dirty="0">
+              <a:solidFill>
+                <a:srgbClr val="000000"/>
+              </a:solidFill>
+              <a:latin typeface="Calibri"/>
+            </a:endParaRPr>
+          </a:p>
+        </p:txBody>
+      </p:sp>
+      <p:sp>
+        <p:nvSpPr>
+          <p:cNvPr id="129" name="PlaceHolder 2"/>
+          <p:cNvSpPr>
+            <a:spLocks noGrp="1"/>
+          </p:cNvSpPr>
+          <p:nvPr>
+            <p:ph/>
+          </p:nvPr>
+        </p:nvSpPr>
+        <p:spPr>
+          <a:xfrm>
+            <a:off x="838080" y="1825560"/>
+            <a:ext cx="10515240" cy="4350960"/>
+          </a:xfrm>
+          <a:prstGeom prst="rect">
+            <a:avLst/>
+          </a:prstGeom>
+          <a:noFill/>
+          <a:ln w="0">
+            <a:noFill/>
+          </a:ln>
+        </p:spPr>
+        <p:txBody>
+          <a:bodyPr anchor="t">
+            <a:noAutofit/>
+          </a:bodyPr>
+          <a:lstStyle/>
+          <a:p>
+            <a:pPr marL="685800" indent="-457200">
+              <a:spcBef>
+                <a:spcPts val="1001"/>
+              </a:spcBef>
+              <a:tabLst>
+                <a:tab pos="0" algn="l"/>
+              </a:tabLst>
+            </a:pPr>
+            <a:r>
+              <a:rPr lang="en-US" sz="2400" b="1" spc="-1" dirty="0">
+                <a:solidFill>
+                  <a:srgbClr val="000000"/>
+                </a:solidFill>
+                <a:latin typeface="Calibri"/>
+              </a:rPr>
+              <a:t>AND </a:t>
+            </a:r>
+            <a:r>
+              <a:rPr lang="en-US" sz="2400" spc="-1" dirty="0">
+                <a:solidFill>
+                  <a:srgbClr val="000000"/>
+                </a:solidFill>
+                <a:latin typeface="Calibri"/>
+              </a:rPr>
+              <a:t>– acts on two variables, and is only true when both variables are true</a:t>
+            </a:r>
+          </a:p>
+          <a:p>
+            <a:pPr marL="685800" indent="-457200">
+              <a:spcBef>
+                <a:spcPts val="1001"/>
+              </a:spcBef>
+              <a:tabLst>
+                <a:tab pos="0" algn="l"/>
+              </a:tabLst>
+            </a:pPr>
+            <a:r>
+              <a:rPr lang="en-US" sz="2400" spc="-1" dirty="0">
+                <a:solidFill>
+                  <a:srgbClr val="000000"/>
+                </a:solidFill>
+                <a:latin typeface="Calibri"/>
+              </a:rPr>
+              <a:t>Example: Lights on and heads flipped = 1 AND 1</a:t>
+            </a:r>
+          </a:p>
+          <a:p>
+            <a:pPr marL="1143000" lvl="1" indent="-457200">
+              <a:spcBef>
+                <a:spcPts val="1001"/>
+              </a:spcBef>
+              <a:tabLst>
+                <a:tab pos="0" algn="l"/>
+              </a:tabLst>
+            </a:pPr>
+            <a:r>
+              <a:rPr lang="en-US" sz="2000" spc="-1" dirty="0">
+                <a:solidFill>
+                  <a:srgbClr val="000000"/>
+                </a:solidFill>
+                <a:latin typeface="Calibri"/>
+              </a:rPr>
+              <a:t>The result: write (with the nib out)</a:t>
+            </a:r>
+          </a:p>
+          <a:p>
+            <a:pPr indent="0">
+              <a:spcBef>
+                <a:spcPts val="1001"/>
+              </a:spcBef>
+              <a:buNone/>
+              <a:tabLst>
+                <a:tab pos="0" algn="l"/>
+              </a:tabLst>
+            </a:pPr>
+            <a:endParaRPr lang="en-US" sz="2400" spc="-1" dirty="0">
+              <a:solidFill>
+                <a:srgbClr val="000000"/>
+              </a:solidFill>
+              <a:latin typeface="Calibri"/>
+            </a:endParaRPr>
+          </a:p>
+          <a:p>
+            <a:pPr indent="0">
+              <a:spcBef>
+                <a:spcPts val="1001"/>
+              </a:spcBef>
+              <a:buNone/>
+              <a:tabLst>
+                <a:tab pos="0" algn="l"/>
+              </a:tabLst>
+            </a:pPr>
+            <a:endParaRPr lang="en-US" sz="2400" spc="-1" dirty="0">
+              <a:solidFill>
+                <a:srgbClr val="000000"/>
+              </a:solidFill>
+              <a:latin typeface="Calibri"/>
+            </a:endParaRPr>
+          </a:p>
+          <a:p>
+            <a:pPr marL="685800" indent="-457200">
+              <a:spcBef>
+                <a:spcPts val="1001"/>
+              </a:spcBef>
+              <a:tabLst>
+                <a:tab pos="0" algn="l"/>
+              </a:tabLst>
+            </a:pPr>
+            <a:endParaRPr lang="en-US" sz="2000" spc="-1" dirty="0">
+              <a:solidFill>
+                <a:srgbClr val="000000"/>
+              </a:solidFill>
+              <a:latin typeface="Calibri"/>
+            </a:endParaRPr>
+          </a:p>
+          <a:p>
+            <a:pPr marL="685800" indent="-457200">
+              <a:spcBef>
+                <a:spcPts val="1001"/>
+              </a:spcBef>
+              <a:tabLst>
+                <a:tab pos="0" algn="l"/>
+              </a:tabLst>
+            </a:pPr>
+            <a:endParaRPr lang="en-US" sz="2000" b="1" spc="-1" dirty="0">
+              <a:solidFill>
+                <a:srgbClr val="000000"/>
+              </a:solidFill>
+              <a:latin typeface="Calibri"/>
+            </a:endParaRPr>
+          </a:p>
+          <a:p>
+            <a:pPr marL="685800" indent="-457200">
+              <a:spcBef>
+                <a:spcPts val="1001"/>
+              </a:spcBef>
+              <a:tabLst>
+                <a:tab pos="0" algn="l"/>
+              </a:tabLst>
+            </a:pPr>
+            <a:endParaRPr lang="en-US" sz="2400" spc="-1" dirty="0">
+              <a:solidFill>
+                <a:srgbClr val="000000"/>
+              </a:solidFill>
+              <a:latin typeface="Calibri"/>
+            </a:endParaRPr>
+          </a:p>
+        </p:txBody>
+      </p:sp>
+    </p:spTree>
+    <p:extLst>
+      <p:ext uri="{BB962C8B-B14F-4D97-AF65-F5344CB8AC3E}">
+        <p14:creationId xmlns:p14="http://schemas.microsoft.com/office/powerpoint/2010/main" val="1744182384"/>
+      </p:ext>
+    </p:extLst>
+  </p:cSld>
+  <p:clrMapOvr>
+    <a:masterClrMapping/>
+  </p:clrMapOvr>
+</p:sld>
+</file>
+
+<file path=ppt/slides/slide56.xml><?xml version="1.0" encoding="utf-8"?>
+<p:sld xmlns:a="http://schemas.openxmlformats.org/drawingml/2006/main" xmlns:r="http://schemas.openxmlformats.org/officeDocument/2006/relationships" xmlns:p="http://schemas.openxmlformats.org/presentationml/2006/main">
+  <p:cSld>
+    <p:spTree>
+      <p:nvGrpSpPr>
+        <p:cNvPr id="1" name=""/>
+        <p:cNvGrpSpPr/>
+        <p:nvPr/>
+      </p:nvGrpSpPr>
+      <p:grpSpPr>
+        <a:xfrm>
+          <a:off x="0" y="0"/>
+          <a:ext cx="0" cy="0"/>
+          <a:chOff x="0" y="0"/>
+          <a:chExt cx="0" cy="0"/>
+        </a:xfrm>
+      </p:grpSpPr>
+      <p:sp>
+        <p:nvSpPr>
+          <p:cNvPr id="128" name="PlaceHolder 1"/>
+          <p:cNvSpPr>
+            <a:spLocks noGrp="1"/>
+          </p:cNvSpPr>
+          <p:nvPr>
+            <p:ph type="title"/>
+          </p:nvPr>
+        </p:nvSpPr>
+        <p:spPr>
+          <a:xfrm>
+            <a:off x="838080" y="365040"/>
+            <a:ext cx="10515240" cy="1325160"/>
+          </a:xfrm>
+          <a:prstGeom prst="rect">
+            <a:avLst/>
+          </a:prstGeom>
+          <a:noFill/>
+          <a:ln w="0">
+            <a:noFill/>
+          </a:ln>
+        </p:spPr>
+        <p:txBody>
+          <a:bodyPr anchor="ctr">
+            <a:noAutofit/>
+          </a:bodyPr>
+          <a:lstStyle/>
+          <a:p>
+            <a:r>
+              <a:rPr lang="en-US" spc="-1" dirty="0">
+                <a:solidFill>
+                  <a:srgbClr val="000000"/>
+                </a:solidFill>
+                <a:latin typeface="Calibri"/>
+              </a:rPr>
+              <a:t>Logical Operators</a:t>
+            </a:r>
+            <a:endParaRPr lang="en-US" sz="4400" b="0" strike="noStrike" spc="-1" dirty="0">
+              <a:solidFill>
+                <a:srgbClr val="000000"/>
+              </a:solidFill>
+              <a:latin typeface="Calibri"/>
+            </a:endParaRPr>
+          </a:p>
+        </p:txBody>
+      </p:sp>
+      <p:sp>
+        <p:nvSpPr>
+          <p:cNvPr id="129" name="PlaceHolder 2"/>
+          <p:cNvSpPr>
+            <a:spLocks noGrp="1"/>
+          </p:cNvSpPr>
+          <p:nvPr>
+            <p:ph/>
+          </p:nvPr>
+        </p:nvSpPr>
+        <p:spPr>
+          <a:xfrm>
+            <a:off x="838080" y="1825560"/>
+            <a:ext cx="10515240" cy="4350960"/>
+          </a:xfrm>
+          <a:prstGeom prst="rect">
+            <a:avLst/>
+          </a:prstGeom>
+          <a:noFill/>
+          <a:ln w="0">
+            <a:noFill/>
+          </a:ln>
+        </p:spPr>
+        <p:txBody>
+          <a:bodyPr anchor="t">
+            <a:noAutofit/>
+          </a:bodyPr>
+          <a:lstStyle/>
+          <a:p>
+            <a:pPr marL="685800" indent="-457200">
+              <a:spcBef>
+                <a:spcPts val="1001"/>
+              </a:spcBef>
+              <a:tabLst>
+                <a:tab pos="0" algn="l"/>
+              </a:tabLst>
+            </a:pPr>
+            <a:r>
+              <a:rPr lang="en-US" sz="2400" b="1" spc="-1" dirty="0">
+                <a:solidFill>
+                  <a:srgbClr val="000000"/>
+                </a:solidFill>
+                <a:latin typeface="Calibri"/>
+              </a:rPr>
+              <a:t>AND </a:t>
+            </a:r>
+            <a:r>
+              <a:rPr lang="en-US" sz="2400" spc="-1" dirty="0">
+                <a:solidFill>
+                  <a:srgbClr val="000000"/>
+                </a:solidFill>
+                <a:latin typeface="Calibri"/>
+              </a:rPr>
+              <a:t>– acts on two variables, and is only true when both variables are true</a:t>
+            </a:r>
+          </a:p>
+          <a:p>
+            <a:pPr marL="685800" indent="-457200">
+              <a:spcBef>
+                <a:spcPts val="1001"/>
+              </a:spcBef>
+              <a:tabLst>
+                <a:tab pos="0" algn="l"/>
+              </a:tabLst>
+            </a:pPr>
+            <a:r>
+              <a:rPr lang="en-US" sz="2400" spc="-1" dirty="0">
+                <a:solidFill>
+                  <a:srgbClr val="000000"/>
+                </a:solidFill>
+                <a:latin typeface="Calibri"/>
+              </a:rPr>
+              <a:t>Example: Lights on and heads flipped = 1 AND 1</a:t>
+            </a:r>
+          </a:p>
+          <a:p>
+            <a:pPr marL="1143000" lvl="1" indent="-457200">
+              <a:spcBef>
+                <a:spcPts val="1001"/>
+              </a:spcBef>
+              <a:tabLst>
+                <a:tab pos="0" algn="l"/>
+              </a:tabLst>
+            </a:pPr>
+            <a:r>
+              <a:rPr lang="en-US" sz="2000" spc="-1" dirty="0">
+                <a:solidFill>
+                  <a:srgbClr val="000000"/>
+                </a:solidFill>
+                <a:latin typeface="Calibri"/>
+              </a:rPr>
+              <a:t>The result: write (with the nib out)</a:t>
+            </a:r>
+          </a:p>
+          <a:p>
+            <a:pPr marL="685800" indent="-457200">
+              <a:spcBef>
+                <a:spcPts val="1001"/>
+              </a:spcBef>
+              <a:tabLst>
+                <a:tab pos="0" algn="l"/>
+              </a:tabLst>
+            </a:pPr>
+            <a:r>
+              <a:rPr lang="en-US" sz="2400" spc="-1" dirty="0">
+                <a:solidFill>
+                  <a:srgbClr val="000000"/>
+                </a:solidFill>
+                <a:latin typeface="Calibri"/>
+              </a:rPr>
+              <a:t>So, 1 AND 1 = 1</a:t>
+            </a:r>
+          </a:p>
+          <a:p>
+            <a:pPr indent="0">
+              <a:spcBef>
+                <a:spcPts val="1001"/>
+              </a:spcBef>
+              <a:buNone/>
+              <a:tabLst>
+                <a:tab pos="0" algn="l"/>
+              </a:tabLst>
+            </a:pPr>
+            <a:endParaRPr lang="en-US" sz="2400" spc="-1" dirty="0">
+              <a:solidFill>
+                <a:srgbClr val="000000"/>
+              </a:solidFill>
+              <a:latin typeface="Calibri"/>
+            </a:endParaRPr>
+          </a:p>
+          <a:p>
+            <a:pPr indent="0">
+              <a:spcBef>
+                <a:spcPts val="1001"/>
+              </a:spcBef>
+              <a:buNone/>
+              <a:tabLst>
+                <a:tab pos="0" algn="l"/>
+              </a:tabLst>
+            </a:pPr>
+            <a:endParaRPr lang="en-US" sz="2400" spc="-1" dirty="0">
+              <a:solidFill>
+                <a:srgbClr val="000000"/>
+              </a:solidFill>
+              <a:latin typeface="Calibri"/>
+            </a:endParaRPr>
+          </a:p>
+          <a:p>
+            <a:pPr marL="685800" indent="-457200">
+              <a:spcBef>
+                <a:spcPts val="1001"/>
+              </a:spcBef>
+              <a:tabLst>
+                <a:tab pos="0" algn="l"/>
+              </a:tabLst>
+            </a:pPr>
+            <a:endParaRPr lang="en-US" sz="2000" spc="-1" dirty="0">
+              <a:solidFill>
+                <a:srgbClr val="000000"/>
+              </a:solidFill>
+              <a:latin typeface="Calibri"/>
+            </a:endParaRPr>
+          </a:p>
+          <a:p>
+            <a:pPr marL="685800" indent="-457200">
+              <a:spcBef>
+                <a:spcPts val="1001"/>
+              </a:spcBef>
+              <a:tabLst>
+                <a:tab pos="0" algn="l"/>
+              </a:tabLst>
+            </a:pPr>
+            <a:endParaRPr lang="en-US" sz="2000" b="1" spc="-1" dirty="0">
+              <a:solidFill>
+                <a:srgbClr val="000000"/>
+              </a:solidFill>
+              <a:latin typeface="Calibri"/>
+            </a:endParaRPr>
+          </a:p>
+          <a:p>
+            <a:pPr marL="685800" indent="-457200">
+              <a:spcBef>
+                <a:spcPts val="1001"/>
+              </a:spcBef>
+              <a:tabLst>
+                <a:tab pos="0" algn="l"/>
+              </a:tabLst>
+            </a:pPr>
+            <a:endParaRPr lang="en-US" sz="2400" spc="-1" dirty="0">
+              <a:solidFill>
+                <a:srgbClr val="000000"/>
+              </a:solidFill>
+              <a:latin typeface="Calibri"/>
+            </a:endParaRPr>
+          </a:p>
+        </p:txBody>
+      </p:sp>
+    </p:spTree>
+    <p:extLst>
+      <p:ext uri="{BB962C8B-B14F-4D97-AF65-F5344CB8AC3E}">
+        <p14:creationId xmlns:p14="http://schemas.microsoft.com/office/powerpoint/2010/main" val="3318706264"/>
+      </p:ext>
+    </p:extLst>
+  </p:cSld>
+  <p:clrMapOvr>
+    <a:masterClrMapping/>
+  </p:clrMapOvr>
+</p:sld>
+</file>
+
+<file path=ppt/slides/slide57.xml><?xml version="1.0" encoding="utf-8"?>
+<p:sld xmlns:a="http://schemas.openxmlformats.org/drawingml/2006/main" xmlns:r="http://schemas.openxmlformats.org/officeDocument/2006/relationships" xmlns:p="http://schemas.openxmlformats.org/presentationml/2006/main">
+  <p:cSld>
+    <p:spTree>
+      <p:nvGrpSpPr>
+        <p:cNvPr id="1" name=""/>
+        <p:cNvGrpSpPr/>
+        <p:nvPr/>
+      </p:nvGrpSpPr>
+      <p:grpSpPr>
+        <a:xfrm>
+          <a:off x="0" y="0"/>
+          <a:ext cx="0" cy="0"/>
+          <a:chOff x="0" y="0"/>
+          <a:chExt cx="0" cy="0"/>
+        </a:xfrm>
+      </p:grpSpPr>
+      <p:sp>
+        <p:nvSpPr>
+          <p:cNvPr id="128" name="PlaceHolder 1"/>
+          <p:cNvSpPr>
+            <a:spLocks noGrp="1"/>
+          </p:cNvSpPr>
+          <p:nvPr>
+            <p:ph type="title"/>
+          </p:nvPr>
+        </p:nvSpPr>
+        <p:spPr>
+          <a:xfrm>
+            <a:off x="838080" y="365040"/>
+            <a:ext cx="10515240" cy="1325160"/>
+          </a:xfrm>
+          <a:prstGeom prst="rect">
+            <a:avLst/>
+          </a:prstGeom>
+          <a:noFill/>
+          <a:ln w="0">
+            <a:noFill/>
+          </a:ln>
+        </p:spPr>
+        <p:txBody>
+          <a:bodyPr anchor="ctr">
+            <a:noAutofit/>
+          </a:bodyPr>
+          <a:lstStyle/>
+          <a:p>
+            <a:r>
+              <a:rPr lang="en-US" spc="-1" dirty="0">
+                <a:solidFill>
+                  <a:srgbClr val="000000"/>
+                </a:solidFill>
+                <a:latin typeface="Calibri"/>
+              </a:rPr>
+              <a:t>Logical Operators</a:t>
+            </a:r>
+            <a:endParaRPr lang="en-US" sz="4400" b="0" strike="noStrike" spc="-1" dirty="0">
+              <a:solidFill>
+                <a:srgbClr val="000000"/>
+              </a:solidFill>
+              <a:latin typeface="Calibri"/>
+            </a:endParaRPr>
+          </a:p>
+        </p:txBody>
+      </p:sp>
+      <p:sp>
+        <p:nvSpPr>
+          <p:cNvPr id="129" name="PlaceHolder 2"/>
+          <p:cNvSpPr>
+            <a:spLocks noGrp="1"/>
+          </p:cNvSpPr>
+          <p:nvPr>
+            <p:ph/>
+          </p:nvPr>
+        </p:nvSpPr>
+        <p:spPr>
+          <a:xfrm>
+            <a:off x="838080" y="1825560"/>
+            <a:ext cx="10515240" cy="4350960"/>
+          </a:xfrm>
+          <a:prstGeom prst="rect">
+            <a:avLst/>
+          </a:prstGeom>
+          <a:noFill/>
+          <a:ln w="0">
+            <a:noFill/>
+          </a:ln>
+        </p:spPr>
+        <p:txBody>
+          <a:bodyPr anchor="t">
+            <a:noAutofit/>
+          </a:bodyPr>
+          <a:lstStyle/>
+          <a:p>
+            <a:pPr marL="685800" indent="-457200">
+              <a:spcBef>
+                <a:spcPts val="1001"/>
+              </a:spcBef>
+              <a:tabLst>
+                <a:tab pos="0" algn="l"/>
+              </a:tabLst>
+            </a:pPr>
+            <a:r>
+              <a:rPr lang="en-US" sz="2400" b="1" spc="-1" dirty="0">
+                <a:solidFill>
+                  <a:srgbClr val="000000"/>
+                </a:solidFill>
+                <a:latin typeface="Calibri"/>
+              </a:rPr>
+              <a:t>AND </a:t>
+            </a:r>
+            <a:r>
+              <a:rPr lang="en-US" sz="2400" spc="-1" dirty="0">
+                <a:solidFill>
+                  <a:srgbClr val="000000"/>
+                </a:solidFill>
+                <a:latin typeface="Calibri"/>
+              </a:rPr>
+              <a:t>– acts on two variables, and is only true when both variables are true</a:t>
+            </a:r>
+          </a:p>
+          <a:p>
+            <a:pPr marL="685800" indent="-457200">
+              <a:spcBef>
+                <a:spcPts val="1001"/>
+              </a:spcBef>
+              <a:tabLst>
+                <a:tab pos="0" algn="l"/>
+              </a:tabLst>
+            </a:pPr>
+            <a:r>
+              <a:rPr lang="en-US" sz="2400" spc="-1" dirty="0">
+                <a:solidFill>
+                  <a:srgbClr val="000000"/>
+                </a:solidFill>
+                <a:latin typeface="Calibri"/>
+              </a:rPr>
+              <a:t>Example: Lights on and tails flipped = ?</a:t>
+            </a:r>
+          </a:p>
+          <a:p>
+            <a:pPr indent="0">
+              <a:spcBef>
+                <a:spcPts val="1001"/>
+              </a:spcBef>
+              <a:buNone/>
+              <a:tabLst>
+                <a:tab pos="0" algn="l"/>
+              </a:tabLst>
+            </a:pPr>
+            <a:endParaRPr lang="en-US" sz="2400" spc="-1" dirty="0">
+              <a:solidFill>
+                <a:srgbClr val="000000"/>
+              </a:solidFill>
+              <a:latin typeface="Calibri"/>
+            </a:endParaRPr>
+          </a:p>
+          <a:p>
+            <a:pPr marL="685800" indent="-457200">
+              <a:spcBef>
+                <a:spcPts val="1001"/>
+              </a:spcBef>
+              <a:tabLst>
+                <a:tab pos="0" algn="l"/>
+              </a:tabLst>
+            </a:pPr>
+            <a:endParaRPr lang="en-US" sz="2000" spc="-1" dirty="0">
+              <a:solidFill>
+                <a:srgbClr val="000000"/>
+              </a:solidFill>
+              <a:latin typeface="Calibri"/>
+            </a:endParaRPr>
+          </a:p>
+          <a:p>
+            <a:pPr marL="685800" indent="-457200">
+              <a:spcBef>
+                <a:spcPts val="1001"/>
+              </a:spcBef>
+              <a:tabLst>
+                <a:tab pos="0" algn="l"/>
+              </a:tabLst>
+            </a:pPr>
+            <a:endParaRPr lang="en-US" sz="2000" b="1" spc="-1" dirty="0">
+              <a:solidFill>
+                <a:srgbClr val="000000"/>
+              </a:solidFill>
+              <a:latin typeface="Calibri"/>
+            </a:endParaRPr>
+          </a:p>
+          <a:p>
+            <a:pPr marL="685800" indent="-457200">
+              <a:spcBef>
+                <a:spcPts val="1001"/>
+              </a:spcBef>
+              <a:tabLst>
+                <a:tab pos="0" algn="l"/>
+              </a:tabLst>
+            </a:pPr>
+            <a:endParaRPr lang="en-US" sz="2400" spc="-1" dirty="0">
+              <a:solidFill>
+                <a:srgbClr val="000000"/>
+              </a:solidFill>
+              <a:latin typeface="Calibri"/>
+            </a:endParaRPr>
+          </a:p>
+        </p:txBody>
+      </p:sp>
+    </p:spTree>
+    <p:extLst>
+      <p:ext uri="{BB962C8B-B14F-4D97-AF65-F5344CB8AC3E}">
+        <p14:creationId xmlns:p14="http://schemas.microsoft.com/office/powerpoint/2010/main" val="3384979219"/>
+      </p:ext>
+    </p:extLst>
+  </p:cSld>
+  <p:clrMapOvr>
+    <a:masterClrMapping/>
+  </p:clrMapOvr>
+</p:sld>
+</file>
+
+<file path=ppt/slides/slide58.xml><?xml version="1.0" encoding="utf-8"?>
+<p:sld xmlns:a="http://schemas.openxmlformats.org/drawingml/2006/main" xmlns:r="http://schemas.openxmlformats.org/officeDocument/2006/relationships" xmlns:p="http://schemas.openxmlformats.org/presentationml/2006/main">
+  <p:cSld>
+    <p:spTree>
+      <p:nvGrpSpPr>
+        <p:cNvPr id="1" name=""/>
+        <p:cNvGrpSpPr/>
+        <p:nvPr/>
+      </p:nvGrpSpPr>
+      <p:grpSpPr>
+        <a:xfrm>
+          <a:off x="0" y="0"/>
+          <a:ext cx="0" cy="0"/>
+          <a:chOff x="0" y="0"/>
+          <a:chExt cx="0" cy="0"/>
+        </a:xfrm>
+      </p:grpSpPr>
+      <p:sp>
+        <p:nvSpPr>
+          <p:cNvPr id="128" name="PlaceHolder 1"/>
+          <p:cNvSpPr>
+            <a:spLocks noGrp="1"/>
+          </p:cNvSpPr>
+          <p:nvPr>
+            <p:ph type="title"/>
+          </p:nvPr>
+        </p:nvSpPr>
+        <p:spPr>
+          <a:xfrm>
+            <a:off x="838080" y="365040"/>
+            <a:ext cx="10515240" cy="1325160"/>
+          </a:xfrm>
+          <a:prstGeom prst="rect">
+            <a:avLst/>
+          </a:prstGeom>
+          <a:noFill/>
+          <a:ln w="0">
+            <a:noFill/>
+          </a:ln>
+        </p:spPr>
+        <p:txBody>
+          <a:bodyPr anchor="ctr">
+            <a:noAutofit/>
+          </a:bodyPr>
+          <a:lstStyle/>
+          <a:p>
+            <a:r>
+              <a:rPr lang="en-US" spc="-1" dirty="0">
+                <a:solidFill>
+                  <a:srgbClr val="000000"/>
+                </a:solidFill>
+                <a:latin typeface="Calibri"/>
+              </a:rPr>
+              <a:t>Logical Operators</a:t>
+            </a:r>
+            <a:endParaRPr lang="en-US" sz="4400" b="0" strike="noStrike" spc="-1" dirty="0">
+              <a:solidFill>
+                <a:srgbClr val="000000"/>
+              </a:solidFill>
+              <a:latin typeface="Calibri"/>
+            </a:endParaRPr>
+          </a:p>
+        </p:txBody>
+      </p:sp>
+      <p:sp>
+        <p:nvSpPr>
+          <p:cNvPr id="129" name="PlaceHolder 2"/>
+          <p:cNvSpPr>
+            <a:spLocks noGrp="1"/>
+          </p:cNvSpPr>
+          <p:nvPr>
+            <p:ph/>
+          </p:nvPr>
+        </p:nvSpPr>
+        <p:spPr>
+          <a:xfrm>
+            <a:off x="838080" y="1825560"/>
+            <a:ext cx="10515240" cy="4350960"/>
+          </a:xfrm>
+          <a:prstGeom prst="rect">
+            <a:avLst/>
+          </a:prstGeom>
+          <a:noFill/>
+          <a:ln w="0">
+            <a:noFill/>
+          </a:ln>
+        </p:spPr>
+        <p:txBody>
+          <a:bodyPr anchor="t">
+            <a:noAutofit/>
+          </a:bodyPr>
+          <a:lstStyle/>
+          <a:p>
+            <a:pPr marL="685800" indent="-457200">
+              <a:spcBef>
+                <a:spcPts val="1001"/>
+              </a:spcBef>
+              <a:tabLst>
+                <a:tab pos="0" algn="l"/>
+              </a:tabLst>
+            </a:pPr>
+            <a:r>
+              <a:rPr lang="en-US" sz="2400" b="1" spc="-1" dirty="0">
+                <a:solidFill>
+                  <a:srgbClr val="000000"/>
+                </a:solidFill>
+                <a:latin typeface="Calibri"/>
+              </a:rPr>
+              <a:t>AND </a:t>
+            </a:r>
+            <a:r>
+              <a:rPr lang="en-US" sz="2400" spc="-1" dirty="0">
+                <a:solidFill>
+                  <a:srgbClr val="000000"/>
+                </a:solidFill>
+                <a:latin typeface="Calibri"/>
+              </a:rPr>
+              <a:t>– acts on two variables, and is only true when both variables are true</a:t>
+            </a:r>
+          </a:p>
+          <a:p>
+            <a:pPr marL="685800" indent="-457200">
+              <a:spcBef>
+                <a:spcPts val="1001"/>
+              </a:spcBef>
+              <a:tabLst>
+                <a:tab pos="0" algn="l"/>
+              </a:tabLst>
+            </a:pPr>
+            <a:r>
+              <a:rPr lang="en-US" sz="2400" spc="-1" dirty="0">
+                <a:solidFill>
+                  <a:srgbClr val="000000"/>
+                </a:solidFill>
+                <a:latin typeface="Calibri"/>
+              </a:rPr>
+              <a:t>Example: Lights on and tails flipped = 1 AND 0</a:t>
+            </a:r>
+          </a:p>
+          <a:p>
+            <a:pPr indent="0">
+              <a:spcBef>
+                <a:spcPts val="1001"/>
+              </a:spcBef>
+              <a:buNone/>
+              <a:tabLst>
+                <a:tab pos="0" algn="l"/>
+              </a:tabLst>
+            </a:pPr>
+            <a:endParaRPr lang="en-US" sz="2400" spc="-1" dirty="0">
+              <a:solidFill>
+                <a:srgbClr val="000000"/>
+              </a:solidFill>
+              <a:latin typeface="Calibri"/>
+            </a:endParaRPr>
+          </a:p>
+          <a:p>
+            <a:pPr marL="685800" indent="-457200">
+              <a:spcBef>
+                <a:spcPts val="1001"/>
+              </a:spcBef>
+              <a:tabLst>
+                <a:tab pos="0" algn="l"/>
+              </a:tabLst>
+            </a:pPr>
+            <a:endParaRPr lang="en-US" sz="2000" spc="-1" dirty="0">
+              <a:solidFill>
+                <a:srgbClr val="000000"/>
+              </a:solidFill>
+              <a:latin typeface="Calibri"/>
+            </a:endParaRPr>
+          </a:p>
+          <a:p>
+            <a:pPr marL="685800" indent="-457200">
+              <a:spcBef>
+                <a:spcPts val="1001"/>
+              </a:spcBef>
+              <a:tabLst>
+                <a:tab pos="0" algn="l"/>
+              </a:tabLst>
+            </a:pPr>
+            <a:endParaRPr lang="en-US" sz="2000" b="1" spc="-1" dirty="0">
+              <a:solidFill>
+                <a:srgbClr val="000000"/>
+              </a:solidFill>
+              <a:latin typeface="Calibri"/>
+            </a:endParaRPr>
+          </a:p>
+          <a:p>
+            <a:pPr marL="685800" indent="-457200">
+              <a:spcBef>
+                <a:spcPts val="1001"/>
+              </a:spcBef>
+              <a:tabLst>
+                <a:tab pos="0" algn="l"/>
+              </a:tabLst>
+            </a:pPr>
+            <a:endParaRPr lang="en-US" sz="2400" spc="-1" dirty="0">
+              <a:solidFill>
+                <a:srgbClr val="000000"/>
+              </a:solidFill>
+              <a:latin typeface="Calibri"/>
+            </a:endParaRPr>
+          </a:p>
+        </p:txBody>
+      </p:sp>
+    </p:spTree>
+    <p:extLst>
+      <p:ext uri="{BB962C8B-B14F-4D97-AF65-F5344CB8AC3E}">
+        <p14:creationId xmlns:p14="http://schemas.microsoft.com/office/powerpoint/2010/main" val="2032415397"/>
+      </p:ext>
+    </p:extLst>
+  </p:cSld>
+  <p:clrMapOvr>
+    <a:masterClrMapping/>
+  </p:clrMapOvr>
+</p:sld>
+</file>
+
+<file path=ppt/slides/slide59.xml><?xml version="1.0" encoding="utf-8"?>
+<p:sld xmlns:a="http://schemas.openxmlformats.org/drawingml/2006/main" xmlns:r="http://schemas.openxmlformats.org/officeDocument/2006/relationships" xmlns:p="http://schemas.openxmlformats.org/presentationml/2006/main">
+  <p:cSld>
+    <p:spTree>
+      <p:nvGrpSpPr>
+        <p:cNvPr id="1" name=""/>
+        <p:cNvGrpSpPr/>
+        <p:nvPr/>
+      </p:nvGrpSpPr>
+      <p:grpSpPr>
+        <a:xfrm>
+          <a:off x="0" y="0"/>
+          <a:ext cx="0" cy="0"/>
+          <a:chOff x="0" y="0"/>
+          <a:chExt cx="0" cy="0"/>
+        </a:xfrm>
+      </p:grpSpPr>
+      <p:sp>
+        <p:nvSpPr>
+          <p:cNvPr id="128" name="PlaceHolder 1"/>
+          <p:cNvSpPr>
+            <a:spLocks noGrp="1"/>
+          </p:cNvSpPr>
+          <p:nvPr>
+            <p:ph type="title"/>
+          </p:nvPr>
+        </p:nvSpPr>
+        <p:spPr>
+          <a:xfrm>
+            <a:off x="838080" y="365040"/>
+            <a:ext cx="10515240" cy="1325160"/>
+          </a:xfrm>
+          <a:prstGeom prst="rect">
+            <a:avLst/>
+          </a:prstGeom>
+          <a:noFill/>
+          <a:ln w="0">
+            <a:noFill/>
+          </a:ln>
+        </p:spPr>
+        <p:txBody>
+          <a:bodyPr anchor="ctr">
+            <a:noAutofit/>
+          </a:bodyPr>
+          <a:lstStyle/>
+          <a:p>
+            <a:r>
+              <a:rPr lang="en-US" spc="-1" dirty="0">
+                <a:solidFill>
+                  <a:srgbClr val="000000"/>
+                </a:solidFill>
+                <a:latin typeface="Calibri"/>
+              </a:rPr>
+              <a:t>Logical Operators</a:t>
+            </a:r>
+            <a:endParaRPr lang="en-US" sz="4400" b="0" strike="noStrike" spc="-1" dirty="0">
+              <a:solidFill>
+                <a:srgbClr val="000000"/>
+              </a:solidFill>
+              <a:latin typeface="Calibri"/>
+            </a:endParaRPr>
+          </a:p>
+        </p:txBody>
+      </p:sp>
+      <p:sp>
+        <p:nvSpPr>
+          <p:cNvPr id="129" name="PlaceHolder 2"/>
+          <p:cNvSpPr>
+            <a:spLocks noGrp="1"/>
+          </p:cNvSpPr>
+          <p:nvPr>
+            <p:ph/>
+          </p:nvPr>
+        </p:nvSpPr>
+        <p:spPr>
+          <a:xfrm>
+            <a:off x="838080" y="1825560"/>
+            <a:ext cx="10515240" cy="4350960"/>
+          </a:xfrm>
+          <a:prstGeom prst="rect">
+            <a:avLst/>
+          </a:prstGeom>
+          <a:noFill/>
+          <a:ln w="0">
+            <a:noFill/>
+          </a:ln>
+        </p:spPr>
+        <p:txBody>
+          <a:bodyPr anchor="t">
+            <a:noAutofit/>
+          </a:bodyPr>
+          <a:lstStyle/>
+          <a:p>
+            <a:pPr marL="685800" indent="-457200">
+              <a:spcBef>
+                <a:spcPts val="1001"/>
+              </a:spcBef>
+              <a:tabLst>
+                <a:tab pos="0" algn="l"/>
+              </a:tabLst>
+            </a:pPr>
+            <a:r>
+              <a:rPr lang="en-US" sz="2400" b="1" spc="-1" dirty="0">
+                <a:solidFill>
+                  <a:srgbClr val="000000"/>
+                </a:solidFill>
+                <a:latin typeface="Calibri"/>
+              </a:rPr>
+              <a:t>AND </a:t>
+            </a:r>
+            <a:r>
+              <a:rPr lang="en-US" sz="2400" spc="-1" dirty="0">
+                <a:solidFill>
+                  <a:srgbClr val="000000"/>
+                </a:solidFill>
+                <a:latin typeface="Calibri"/>
+              </a:rPr>
+              <a:t>– acts on two variables, and is only true when both variables are true</a:t>
+            </a:r>
+          </a:p>
+          <a:p>
+            <a:pPr marL="685800" indent="-457200">
+              <a:spcBef>
+                <a:spcPts val="1001"/>
+              </a:spcBef>
+              <a:tabLst>
+                <a:tab pos="0" algn="l"/>
+              </a:tabLst>
+            </a:pPr>
+            <a:r>
+              <a:rPr lang="en-US" sz="2400" spc="-1" dirty="0">
+                <a:solidFill>
+                  <a:srgbClr val="000000"/>
+                </a:solidFill>
+                <a:latin typeface="Calibri"/>
+              </a:rPr>
+              <a:t>Example: Lights on and tails flipped = 1 AND 0</a:t>
+            </a:r>
+          </a:p>
+          <a:p>
+            <a:pPr marL="1143000" lvl="1" indent="-457200">
+              <a:spcBef>
+                <a:spcPts val="1001"/>
+              </a:spcBef>
+              <a:tabLst>
+                <a:tab pos="0" algn="l"/>
+              </a:tabLst>
+            </a:pPr>
+            <a:r>
+              <a:rPr lang="en-US" sz="2000" spc="-1" dirty="0">
+                <a:solidFill>
+                  <a:srgbClr val="000000"/>
+                </a:solidFill>
+                <a:latin typeface="Calibri"/>
+              </a:rPr>
+              <a:t>Do we write in this case?</a:t>
+            </a:r>
+          </a:p>
+          <a:p>
+            <a:pPr marL="1143000" lvl="1" indent="-457200">
+              <a:spcBef>
+                <a:spcPts val="1001"/>
+              </a:spcBef>
+              <a:tabLst>
+                <a:tab pos="0" algn="l"/>
+              </a:tabLst>
+            </a:pPr>
+            <a:endParaRPr lang="en-US" sz="1600" spc="-1" dirty="0">
+              <a:solidFill>
+                <a:srgbClr val="000000"/>
+              </a:solidFill>
+              <a:latin typeface="Calibri"/>
+            </a:endParaRPr>
+          </a:p>
+          <a:p>
+            <a:pPr indent="0">
+              <a:spcBef>
+                <a:spcPts val="1001"/>
+              </a:spcBef>
+              <a:buNone/>
+              <a:tabLst>
+                <a:tab pos="0" algn="l"/>
+              </a:tabLst>
+            </a:pPr>
+            <a:endParaRPr lang="en-US" sz="2400" spc="-1" dirty="0">
+              <a:solidFill>
+                <a:srgbClr val="000000"/>
+              </a:solidFill>
+              <a:latin typeface="Calibri"/>
+            </a:endParaRPr>
+          </a:p>
+          <a:p>
+            <a:pPr marL="685800" indent="-457200">
+              <a:spcBef>
+                <a:spcPts val="1001"/>
+              </a:spcBef>
+              <a:tabLst>
+                <a:tab pos="0" algn="l"/>
+              </a:tabLst>
+            </a:pPr>
+            <a:endParaRPr lang="en-US" sz="2000" spc="-1" dirty="0">
+              <a:solidFill>
+                <a:srgbClr val="000000"/>
+              </a:solidFill>
+              <a:latin typeface="Calibri"/>
+            </a:endParaRPr>
+          </a:p>
+          <a:p>
+            <a:pPr marL="685800" indent="-457200">
+              <a:spcBef>
+                <a:spcPts val="1001"/>
+              </a:spcBef>
+              <a:tabLst>
+                <a:tab pos="0" algn="l"/>
+              </a:tabLst>
+            </a:pPr>
+            <a:endParaRPr lang="en-US" sz="2000" b="1" spc="-1" dirty="0">
+              <a:solidFill>
+                <a:srgbClr val="000000"/>
+              </a:solidFill>
+              <a:latin typeface="Calibri"/>
+            </a:endParaRPr>
+          </a:p>
+          <a:p>
+            <a:pPr marL="685800" indent="-457200">
+              <a:spcBef>
+                <a:spcPts val="1001"/>
+              </a:spcBef>
+              <a:tabLst>
+                <a:tab pos="0" algn="l"/>
+              </a:tabLst>
+            </a:pPr>
+            <a:endParaRPr lang="en-US" sz="2400" spc="-1" dirty="0">
+              <a:solidFill>
+                <a:srgbClr val="000000"/>
+              </a:solidFill>
+              <a:latin typeface="Calibri"/>
+            </a:endParaRPr>
+          </a:p>
+        </p:txBody>
+      </p:sp>
+    </p:spTree>
+    <p:extLst>
+      <p:ext uri="{BB962C8B-B14F-4D97-AF65-F5344CB8AC3E}">
+        <p14:creationId xmlns:p14="http://schemas.microsoft.com/office/powerpoint/2010/main" val="2052406797"/>
+      </p:ext>
+    </p:extLst>
+  </p:cSld>
+  <p:clrMapOvr>
+    <a:masterClrMapping/>
+  </p:clrMapOvr>
+</p:sld>
+</file>
+
 <file path=ppt/slides/slide6.xml><?xml version="1.0" encoding="utf-8"?>
 <p:sld xmlns:a="http://schemas.openxmlformats.org/drawingml/2006/main" xmlns:r="http://schemas.openxmlformats.org/officeDocument/2006/relationships" xmlns:p="http://schemas.openxmlformats.org/presentationml/2006/main">
   <p:cSld>
@@ -18403,6 +21173,789 @@
     <p:extLst>
       <p:ext uri="{BB962C8B-B14F-4D97-AF65-F5344CB8AC3E}">
         <p14:creationId xmlns:p14="http://schemas.microsoft.com/office/powerpoint/2010/main" val="2840438948"/>
+      </p:ext>
+    </p:extLst>
+  </p:cSld>
+  <p:clrMapOvr>
+    <a:masterClrMapping/>
+  </p:clrMapOvr>
+</p:sld>
+</file>
+
+<file path=ppt/slides/slide60.xml><?xml version="1.0" encoding="utf-8"?>
+<p:sld xmlns:a="http://schemas.openxmlformats.org/drawingml/2006/main" xmlns:r="http://schemas.openxmlformats.org/officeDocument/2006/relationships" xmlns:p="http://schemas.openxmlformats.org/presentationml/2006/main">
+  <p:cSld>
+    <p:spTree>
+      <p:nvGrpSpPr>
+        <p:cNvPr id="1" name=""/>
+        <p:cNvGrpSpPr/>
+        <p:nvPr/>
+      </p:nvGrpSpPr>
+      <p:grpSpPr>
+        <a:xfrm>
+          <a:off x="0" y="0"/>
+          <a:ext cx="0" cy="0"/>
+          <a:chOff x="0" y="0"/>
+          <a:chExt cx="0" cy="0"/>
+        </a:xfrm>
+      </p:grpSpPr>
+      <p:sp>
+        <p:nvSpPr>
+          <p:cNvPr id="128" name="PlaceHolder 1"/>
+          <p:cNvSpPr>
+            <a:spLocks noGrp="1"/>
+          </p:cNvSpPr>
+          <p:nvPr>
+            <p:ph type="title"/>
+          </p:nvPr>
+        </p:nvSpPr>
+        <p:spPr>
+          <a:xfrm>
+            <a:off x="838080" y="365040"/>
+            <a:ext cx="10515240" cy="1325160"/>
+          </a:xfrm>
+          <a:prstGeom prst="rect">
+            <a:avLst/>
+          </a:prstGeom>
+          <a:noFill/>
+          <a:ln w="0">
+            <a:noFill/>
+          </a:ln>
+        </p:spPr>
+        <p:txBody>
+          <a:bodyPr anchor="ctr">
+            <a:noAutofit/>
+          </a:bodyPr>
+          <a:lstStyle/>
+          <a:p>
+            <a:r>
+              <a:rPr lang="en-US" spc="-1" dirty="0">
+                <a:solidFill>
+                  <a:srgbClr val="000000"/>
+                </a:solidFill>
+                <a:latin typeface="Calibri"/>
+              </a:rPr>
+              <a:t>Logical Operators</a:t>
+            </a:r>
+            <a:endParaRPr lang="en-US" sz="4400" b="0" strike="noStrike" spc="-1" dirty="0">
+              <a:solidFill>
+                <a:srgbClr val="000000"/>
+              </a:solidFill>
+              <a:latin typeface="Calibri"/>
+            </a:endParaRPr>
+          </a:p>
+        </p:txBody>
+      </p:sp>
+      <p:sp>
+        <p:nvSpPr>
+          <p:cNvPr id="129" name="PlaceHolder 2"/>
+          <p:cNvSpPr>
+            <a:spLocks noGrp="1"/>
+          </p:cNvSpPr>
+          <p:nvPr>
+            <p:ph/>
+          </p:nvPr>
+        </p:nvSpPr>
+        <p:spPr>
+          <a:xfrm>
+            <a:off x="838080" y="1825560"/>
+            <a:ext cx="10515240" cy="4350960"/>
+          </a:xfrm>
+          <a:prstGeom prst="rect">
+            <a:avLst/>
+          </a:prstGeom>
+          <a:noFill/>
+          <a:ln w="0">
+            <a:noFill/>
+          </a:ln>
+        </p:spPr>
+        <p:txBody>
+          <a:bodyPr anchor="t">
+            <a:noAutofit/>
+          </a:bodyPr>
+          <a:lstStyle/>
+          <a:p>
+            <a:pPr marL="685800" indent="-457200">
+              <a:spcBef>
+                <a:spcPts val="1001"/>
+              </a:spcBef>
+              <a:tabLst>
+                <a:tab pos="0" algn="l"/>
+              </a:tabLst>
+            </a:pPr>
+            <a:r>
+              <a:rPr lang="en-US" sz="2400" b="1" spc="-1" dirty="0">
+                <a:solidFill>
+                  <a:srgbClr val="000000"/>
+                </a:solidFill>
+                <a:latin typeface="Calibri"/>
+              </a:rPr>
+              <a:t>AND </a:t>
+            </a:r>
+            <a:r>
+              <a:rPr lang="en-US" sz="2400" spc="-1" dirty="0">
+                <a:solidFill>
+                  <a:srgbClr val="000000"/>
+                </a:solidFill>
+                <a:latin typeface="Calibri"/>
+              </a:rPr>
+              <a:t>– acts on two variables, and is only true when both variables are true</a:t>
+            </a:r>
+          </a:p>
+          <a:p>
+            <a:pPr marL="685800" indent="-457200">
+              <a:spcBef>
+                <a:spcPts val="1001"/>
+              </a:spcBef>
+              <a:tabLst>
+                <a:tab pos="0" algn="l"/>
+              </a:tabLst>
+            </a:pPr>
+            <a:r>
+              <a:rPr lang="en-US" sz="2400" spc="-1" dirty="0">
+                <a:solidFill>
+                  <a:srgbClr val="000000"/>
+                </a:solidFill>
+                <a:latin typeface="Calibri"/>
+              </a:rPr>
+              <a:t>Example: Lights on and tails flipped = 1 AND 0</a:t>
+            </a:r>
+          </a:p>
+          <a:p>
+            <a:pPr marL="1143000" lvl="1" indent="-457200">
+              <a:spcBef>
+                <a:spcPts val="1001"/>
+              </a:spcBef>
+              <a:tabLst>
+                <a:tab pos="0" algn="l"/>
+              </a:tabLst>
+            </a:pPr>
+            <a:r>
+              <a:rPr lang="en-US" sz="2000" spc="-1" dirty="0">
+                <a:solidFill>
+                  <a:srgbClr val="000000"/>
+                </a:solidFill>
+                <a:latin typeface="Calibri"/>
+              </a:rPr>
+              <a:t>Do we write in this case? No!</a:t>
+            </a:r>
+          </a:p>
+          <a:p>
+            <a:pPr marL="685800" indent="-457200">
+              <a:spcBef>
+                <a:spcPts val="1001"/>
+              </a:spcBef>
+              <a:tabLst>
+                <a:tab pos="0" algn="l"/>
+              </a:tabLst>
+            </a:pPr>
+            <a:r>
+              <a:rPr lang="en-US" sz="2400" spc="-1" dirty="0">
+                <a:solidFill>
+                  <a:srgbClr val="000000"/>
+                </a:solidFill>
+                <a:latin typeface="Calibri"/>
+              </a:rPr>
+              <a:t>So, 1 AND 0 = 0</a:t>
+            </a:r>
+          </a:p>
+          <a:p>
+            <a:pPr indent="0">
+              <a:spcBef>
+                <a:spcPts val="1001"/>
+              </a:spcBef>
+              <a:buNone/>
+              <a:tabLst>
+                <a:tab pos="0" algn="l"/>
+              </a:tabLst>
+            </a:pPr>
+            <a:endParaRPr lang="en-US" sz="2400" spc="-1" dirty="0">
+              <a:solidFill>
+                <a:srgbClr val="000000"/>
+              </a:solidFill>
+              <a:latin typeface="Calibri"/>
+            </a:endParaRPr>
+          </a:p>
+          <a:p>
+            <a:pPr marL="685800" indent="-457200">
+              <a:spcBef>
+                <a:spcPts val="1001"/>
+              </a:spcBef>
+              <a:tabLst>
+                <a:tab pos="0" algn="l"/>
+              </a:tabLst>
+            </a:pPr>
+            <a:endParaRPr lang="en-US" sz="2000" spc="-1" dirty="0">
+              <a:solidFill>
+                <a:srgbClr val="000000"/>
+              </a:solidFill>
+              <a:latin typeface="Calibri"/>
+            </a:endParaRPr>
+          </a:p>
+          <a:p>
+            <a:pPr marL="685800" indent="-457200">
+              <a:spcBef>
+                <a:spcPts val="1001"/>
+              </a:spcBef>
+              <a:tabLst>
+                <a:tab pos="0" algn="l"/>
+              </a:tabLst>
+            </a:pPr>
+            <a:endParaRPr lang="en-US" sz="2000" b="1" spc="-1" dirty="0">
+              <a:solidFill>
+                <a:srgbClr val="000000"/>
+              </a:solidFill>
+              <a:latin typeface="Calibri"/>
+            </a:endParaRPr>
+          </a:p>
+          <a:p>
+            <a:pPr marL="685800" indent="-457200">
+              <a:spcBef>
+                <a:spcPts val="1001"/>
+              </a:spcBef>
+              <a:tabLst>
+                <a:tab pos="0" algn="l"/>
+              </a:tabLst>
+            </a:pPr>
+            <a:endParaRPr lang="en-US" sz="2400" spc="-1" dirty="0">
+              <a:solidFill>
+                <a:srgbClr val="000000"/>
+              </a:solidFill>
+              <a:latin typeface="Calibri"/>
+            </a:endParaRPr>
+          </a:p>
+        </p:txBody>
+      </p:sp>
+    </p:spTree>
+    <p:extLst>
+      <p:ext uri="{BB962C8B-B14F-4D97-AF65-F5344CB8AC3E}">
+        <p14:creationId xmlns:p14="http://schemas.microsoft.com/office/powerpoint/2010/main" val="3379362684"/>
+      </p:ext>
+    </p:extLst>
+  </p:cSld>
+  <p:clrMapOvr>
+    <a:masterClrMapping/>
+  </p:clrMapOvr>
+</p:sld>
+</file>
+
+<file path=ppt/slides/slide61.xml><?xml version="1.0" encoding="utf-8"?>
+<p:sld xmlns:a="http://schemas.openxmlformats.org/drawingml/2006/main" xmlns:r="http://schemas.openxmlformats.org/officeDocument/2006/relationships" xmlns:p="http://schemas.openxmlformats.org/presentationml/2006/main">
+  <p:cSld>
+    <p:spTree>
+      <p:nvGrpSpPr>
+        <p:cNvPr id="1" name=""/>
+        <p:cNvGrpSpPr/>
+        <p:nvPr/>
+      </p:nvGrpSpPr>
+      <p:grpSpPr>
+        <a:xfrm>
+          <a:off x="0" y="0"/>
+          <a:ext cx="0" cy="0"/>
+          <a:chOff x="0" y="0"/>
+          <a:chExt cx="0" cy="0"/>
+        </a:xfrm>
+      </p:grpSpPr>
+      <p:sp>
+        <p:nvSpPr>
+          <p:cNvPr id="128" name="PlaceHolder 1"/>
+          <p:cNvSpPr>
+            <a:spLocks noGrp="1"/>
+          </p:cNvSpPr>
+          <p:nvPr>
+            <p:ph type="title"/>
+          </p:nvPr>
+        </p:nvSpPr>
+        <p:spPr>
+          <a:xfrm>
+            <a:off x="838080" y="365040"/>
+            <a:ext cx="10515240" cy="1325160"/>
+          </a:xfrm>
+          <a:prstGeom prst="rect">
+            <a:avLst/>
+          </a:prstGeom>
+          <a:noFill/>
+          <a:ln w="0">
+            <a:noFill/>
+          </a:ln>
+        </p:spPr>
+        <p:txBody>
+          <a:bodyPr anchor="ctr">
+            <a:noAutofit/>
+          </a:bodyPr>
+          <a:lstStyle/>
+          <a:p>
+            <a:r>
+              <a:rPr lang="en-US" spc="-1" dirty="0">
+                <a:solidFill>
+                  <a:srgbClr val="000000"/>
+                </a:solidFill>
+                <a:latin typeface="Calibri"/>
+              </a:rPr>
+              <a:t>Logical Operators</a:t>
+            </a:r>
+            <a:endParaRPr lang="en-US" sz="4400" b="0" strike="noStrike" spc="-1" dirty="0">
+              <a:solidFill>
+                <a:srgbClr val="000000"/>
+              </a:solidFill>
+              <a:latin typeface="Calibri"/>
+            </a:endParaRPr>
+          </a:p>
+        </p:txBody>
+      </p:sp>
+      <p:sp>
+        <p:nvSpPr>
+          <p:cNvPr id="129" name="PlaceHolder 2"/>
+          <p:cNvSpPr>
+            <a:spLocks noGrp="1"/>
+          </p:cNvSpPr>
+          <p:nvPr>
+            <p:ph/>
+          </p:nvPr>
+        </p:nvSpPr>
+        <p:spPr>
+          <a:xfrm>
+            <a:off x="838080" y="1825560"/>
+            <a:ext cx="10515240" cy="4350960"/>
+          </a:xfrm>
+          <a:prstGeom prst="rect">
+            <a:avLst/>
+          </a:prstGeom>
+          <a:noFill/>
+          <a:ln w="0">
+            <a:noFill/>
+          </a:ln>
+        </p:spPr>
+        <p:txBody>
+          <a:bodyPr anchor="t">
+            <a:noAutofit/>
+          </a:bodyPr>
+          <a:lstStyle/>
+          <a:p>
+            <a:pPr marL="685800" indent="-457200">
+              <a:spcBef>
+                <a:spcPts val="1001"/>
+              </a:spcBef>
+              <a:tabLst>
+                <a:tab pos="0" algn="l"/>
+              </a:tabLst>
+            </a:pPr>
+            <a:r>
+              <a:rPr lang="en-US" sz="2400" spc="-1" dirty="0">
+                <a:solidFill>
+                  <a:srgbClr val="000000"/>
+                </a:solidFill>
+                <a:latin typeface="Calibri"/>
+              </a:rPr>
+              <a:t>Truth Table for </a:t>
+            </a:r>
+            <a:r>
+              <a:rPr lang="en-US" sz="2400" b="1" spc="-1" dirty="0">
+                <a:solidFill>
+                  <a:srgbClr val="000000"/>
+                </a:solidFill>
+                <a:latin typeface="Calibri"/>
+              </a:rPr>
+              <a:t>AND </a:t>
+            </a:r>
+            <a:r>
+              <a:rPr lang="en-US" sz="2400" spc="-1" dirty="0">
+                <a:solidFill>
+                  <a:srgbClr val="000000"/>
+                </a:solidFill>
+                <a:latin typeface="Calibri"/>
+              </a:rPr>
+              <a:t>(variables A and B)</a:t>
+            </a:r>
+          </a:p>
+          <a:p>
+            <a:pPr marL="685800" indent="-457200">
+              <a:spcBef>
+                <a:spcPts val="1001"/>
+              </a:spcBef>
+              <a:tabLst>
+                <a:tab pos="0" algn="l"/>
+              </a:tabLst>
+            </a:pPr>
+            <a:endParaRPr lang="en-US" sz="2400" spc="-1" dirty="0">
+              <a:solidFill>
+                <a:srgbClr val="000000"/>
+              </a:solidFill>
+              <a:latin typeface="Calibri"/>
+            </a:endParaRPr>
+          </a:p>
+          <a:p>
+            <a:pPr marL="685800" indent="-457200">
+              <a:spcBef>
+                <a:spcPts val="1001"/>
+              </a:spcBef>
+              <a:tabLst>
+                <a:tab pos="0" algn="l"/>
+              </a:tabLst>
+            </a:pPr>
+            <a:endParaRPr lang="en-US" sz="2400" spc="-1" dirty="0">
+              <a:solidFill>
+                <a:srgbClr val="000000"/>
+              </a:solidFill>
+              <a:latin typeface="Calibri"/>
+            </a:endParaRPr>
+          </a:p>
+          <a:p>
+            <a:pPr marL="685800" indent="-457200">
+              <a:spcBef>
+                <a:spcPts val="1001"/>
+              </a:spcBef>
+              <a:tabLst>
+                <a:tab pos="0" algn="l"/>
+              </a:tabLst>
+            </a:pPr>
+            <a:endParaRPr lang="en-US" sz="2000" spc="-1" dirty="0">
+              <a:solidFill>
+                <a:srgbClr val="000000"/>
+              </a:solidFill>
+              <a:latin typeface="Calibri"/>
+            </a:endParaRPr>
+          </a:p>
+          <a:p>
+            <a:pPr marL="685800" indent="-457200">
+              <a:spcBef>
+                <a:spcPts val="1001"/>
+              </a:spcBef>
+              <a:tabLst>
+                <a:tab pos="0" algn="l"/>
+              </a:tabLst>
+            </a:pPr>
+            <a:endParaRPr lang="en-US" sz="2000" b="1" spc="-1" dirty="0">
+              <a:solidFill>
+                <a:srgbClr val="000000"/>
+              </a:solidFill>
+              <a:latin typeface="Calibri"/>
+            </a:endParaRPr>
+          </a:p>
+          <a:p>
+            <a:pPr marL="685800" indent="-457200">
+              <a:spcBef>
+                <a:spcPts val="1001"/>
+              </a:spcBef>
+              <a:tabLst>
+                <a:tab pos="0" algn="l"/>
+              </a:tabLst>
+            </a:pPr>
+            <a:endParaRPr lang="en-US" sz="2400" spc="-1" dirty="0">
+              <a:solidFill>
+                <a:srgbClr val="000000"/>
+              </a:solidFill>
+              <a:latin typeface="Calibri"/>
+            </a:endParaRPr>
+          </a:p>
+        </p:txBody>
+      </p:sp>
+      <p:graphicFrame>
+        <p:nvGraphicFramePr>
+          <p:cNvPr id="2" name="Table 1">
+            <a:extLst>
+              <a:ext uri="{FF2B5EF4-FFF2-40B4-BE49-F238E27FC236}">
+                <a16:creationId xmlns:a16="http://schemas.microsoft.com/office/drawing/2014/main" id="{2EEAC070-88BB-4228-97CB-C0B46B140214}"/>
+              </a:ext>
+            </a:extLst>
+          </p:cNvPr>
+          <p:cNvGraphicFramePr>
+            <a:graphicFrameLocks noGrp="1"/>
+          </p:cNvGraphicFramePr>
+          <p:nvPr>
+            <p:extLst>
+              <p:ext uri="{D42A27DB-BD31-4B8C-83A1-F6EECF244321}">
+                <p14:modId xmlns:p14="http://schemas.microsoft.com/office/powerpoint/2010/main" val="2551536323"/>
+              </p:ext>
+            </p:extLst>
+          </p:nvPr>
+        </p:nvGraphicFramePr>
+        <p:xfrm>
+          <a:off x="771370" y="2717142"/>
+          <a:ext cx="8127999" cy="1854200"/>
+        </p:xfrm>
+        <a:graphic>
+          <a:graphicData uri="http://schemas.openxmlformats.org/drawingml/2006/table">
+            <a:tbl>
+              <a:tblPr firstRow="1" bandRow="1">
+                <a:tableStyleId>{5940675A-B579-460E-94D1-54222C63F5DA}</a:tableStyleId>
+              </a:tblPr>
+              <a:tblGrid>
+                <a:gridCol w="2709333">
+                  <a:extLst>
+                    <a:ext uri="{9D8B030D-6E8A-4147-A177-3AD203B41FA5}">
+                      <a16:colId xmlns:a16="http://schemas.microsoft.com/office/drawing/2014/main" val="710072763"/>
+                    </a:ext>
+                  </a:extLst>
+                </a:gridCol>
+                <a:gridCol w="2709333">
+                  <a:extLst>
+                    <a:ext uri="{9D8B030D-6E8A-4147-A177-3AD203B41FA5}">
+                      <a16:colId xmlns:a16="http://schemas.microsoft.com/office/drawing/2014/main" val="2904645117"/>
+                    </a:ext>
+                  </a:extLst>
+                </a:gridCol>
+                <a:gridCol w="2709333">
+                  <a:extLst>
+                    <a:ext uri="{9D8B030D-6E8A-4147-A177-3AD203B41FA5}">
+                      <a16:colId xmlns:a16="http://schemas.microsoft.com/office/drawing/2014/main" val="969079779"/>
+                    </a:ext>
+                  </a:extLst>
+                </a:gridCol>
+              </a:tblGrid>
+              <a:tr h="370840">
+                <a:tc>
+                  <a:txBody>
+                    <a:bodyPr/>
+                    <a:lstStyle/>
+                    <a:p>
+                      <a:pPr algn="ctr"/>
+                      <a:r>
+                        <a:rPr lang="en-US" dirty="0"/>
+                        <a:t>A</a:t>
+                      </a:r>
+                    </a:p>
+                  </a:txBody>
+                  <a:tcPr/>
+                </a:tc>
+                <a:tc>
+                  <a:txBody>
+                    <a:bodyPr/>
+                    <a:lstStyle/>
+                    <a:p>
+                      <a:pPr algn="ctr"/>
+                      <a:r>
+                        <a:rPr lang="en-US" dirty="0"/>
+                        <a:t>B</a:t>
+                      </a:r>
+                    </a:p>
+                  </a:txBody>
+                  <a:tcPr/>
+                </a:tc>
+                <a:tc>
+                  <a:txBody>
+                    <a:bodyPr/>
+                    <a:lstStyle/>
+                    <a:p>
+                      <a:pPr algn="ctr"/>
+                      <a:r>
+                        <a:rPr lang="en-US" dirty="0"/>
+                        <a:t>A AND B</a:t>
+                      </a:r>
+                    </a:p>
+                  </a:txBody>
+                  <a:tcPr/>
+                </a:tc>
+                <a:extLst>
+                  <a:ext uri="{0D108BD9-81ED-4DB2-BD59-A6C34878D82A}">
+                    <a16:rowId xmlns:a16="http://schemas.microsoft.com/office/drawing/2014/main" val="4116821652"/>
+                  </a:ext>
+                </a:extLst>
+              </a:tr>
+              <a:tr h="370840">
+                <a:tc>
+                  <a:txBody>
+                    <a:bodyPr/>
+                    <a:lstStyle/>
+                    <a:p>
+                      <a:pPr algn="ctr"/>
+                      <a:r>
+                        <a:rPr lang="en-US" dirty="0"/>
+                        <a:t>0</a:t>
+                      </a:r>
+                    </a:p>
+                  </a:txBody>
+                  <a:tcPr/>
+                </a:tc>
+                <a:tc>
+                  <a:txBody>
+                    <a:bodyPr/>
+                    <a:lstStyle/>
+                    <a:p>
+                      <a:pPr algn="ctr"/>
+                      <a:r>
+                        <a:rPr lang="en-US" dirty="0"/>
+                        <a:t>0</a:t>
+                      </a:r>
+                    </a:p>
+                  </a:txBody>
+                  <a:tcPr/>
+                </a:tc>
+                <a:tc>
+                  <a:txBody>
+                    <a:bodyPr/>
+                    <a:lstStyle/>
+                    <a:p>
+                      <a:pPr algn="ctr"/>
+                      <a:r>
+                        <a:rPr lang="en-US" dirty="0"/>
+                        <a:t>0</a:t>
+                      </a:r>
+                    </a:p>
+                  </a:txBody>
+                  <a:tcPr/>
+                </a:tc>
+                <a:extLst>
+                  <a:ext uri="{0D108BD9-81ED-4DB2-BD59-A6C34878D82A}">
+                    <a16:rowId xmlns:a16="http://schemas.microsoft.com/office/drawing/2014/main" val="1459408182"/>
+                  </a:ext>
+                </a:extLst>
+              </a:tr>
+              <a:tr h="370840">
+                <a:tc>
+                  <a:txBody>
+                    <a:bodyPr/>
+                    <a:lstStyle/>
+                    <a:p>
+                      <a:pPr algn="ctr"/>
+                      <a:r>
+                        <a:rPr lang="en-US" dirty="0"/>
+                        <a:t>0</a:t>
+                      </a:r>
+                    </a:p>
+                  </a:txBody>
+                  <a:tcPr/>
+                </a:tc>
+                <a:tc>
+                  <a:txBody>
+                    <a:bodyPr/>
+                    <a:lstStyle/>
+                    <a:p>
+                      <a:pPr algn="ctr"/>
+                      <a:r>
+                        <a:rPr lang="en-US" dirty="0"/>
+                        <a:t>1</a:t>
+                      </a:r>
+                    </a:p>
+                  </a:txBody>
+                  <a:tcPr/>
+                </a:tc>
+                <a:tc>
+                  <a:txBody>
+                    <a:bodyPr/>
+                    <a:lstStyle/>
+                    <a:p>
+                      <a:pPr algn="ctr"/>
+                      <a:r>
+                        <a:rPr lang="en-US" dirty="0"/>
+                        <a:t>0</a:t>
+                      </a:r>
+                    </a:p>
+                  </a:txBody>
+                  <a:tcPr/>
+                </a:tc>
+                <a:extLst>
+                  <a:ext uri="{0D108BD9-81ED-4DB2-BD59-A6C34878D82A}">
+                    <a16:rowId xmlns:a16="http://schemas.microsoft.com/office/drawing/2014/main" val="1874452444"/>
+                  </a:ext>
+                </a:extLst>
+              </a:tr>
+              <a:tr h="370840">
+                <a:tc>
+                  <a:txBody>
+                    <a:bodyPr/>
+                    <a:lstStyle/>
+                    <a:p>
+                      <a:pPr algn="ctr"/>
+                      <a:r>
+                        <a:rPr lang="en-US" dirty="0"/>
+                        <a:t>1</a:t>
+                      </a:r>
+                    </a:p>
+                  </a:txBody>
+                  <a:tcPr/>
+                </a:tc>
+                <a:tc>
+                  <a:txBody>
+                    <a:bodyPr/>
+                    <a:lstStyle/>
+                    <a:p>
+                      <a:pPr algn="ctr"/>
+                      <a:r>
+                        <a:rPr lang="en-US" dirty="0"/>
+                        <a:t>0</a:t>
+                      </a:r>
+                    </a:p>
+                  </a:txBody>
+                  <a:tcPr/>
+                </a:tc>
+                <a:tc>
+                  <a:txBody>
+                    <a:bodyPr/>
+                    <a:lstStyle/>
+                    <a:p>
+                      <a:pPr algn="ctr"/>
+                      <a:r>
+                        <a:rPr lang="en-US" dirty="0"/>
+                        <a:t>0</a:t>
+                      </a:r>
+                    </a:p>
+                  </a:txBody>
+                  <a:tcPr/>
+                </a:tc>
+                <a:extLst>
+                  <a:ext uri="{0D108BD9-81ED-4DB2-BD59-A6C34878D82A}">
+                    <a16:rowId xmlns:a16="http://schemas.microsoft.com/office/drawing/2014/main" val="2369238703"/>
+                  </a:ext>
+                </a:extLst>
+              </a:tr>
+              <a:tr h="370840">
+                <a:tc>
+                  <a:txBody>
+                    <a:bodyPr/>
+                    <a:lstStyle/>
+                    <a:p>
+                      <a:pPr algn="ctr"/>
+                      <a:r>
+                        <a:rPr lang="en-US" dirty="0"/>
+                        <a:t>1</a:t>
+                      </a:r>
+                    </a:p>
+                  </a:txBody>
+                  <a:tcPr/>
+                </a:tc>
+                <a:tc>
+                  <a:txBody>
+                    <a:bodyPr/>
+                    <a:lstStyle/>
+                    <a:p>
+                      <a:pPr algn="ctr"/>
+                      <a:r>
+                        <a:rPr lang="en-US" dirty="0"/>
+                        <a:t>1</a:t>
+                      </a:r>
+                    </a:p>
+                  </a:txBody>
+                  <a:tcPr/>
+                </a:tc>
+                <a:tc>
+                  <a:txBody>
+                    <a:bodyPr/>
+                    <a:lstStyle/>
+                    <a:p>
+                      <a:pPr algn="ctr"/>
+                      <a:r>
+                        <a:rPr lang="en-US" dirty="0"/>
+                        <a:t>1</a:t>
+                      </a:r>
+                    </a:p>
+                  </a:txBody>
+                  <a:tcPr/>
+                </a:tc>
+                <a:extLst>
+                  <a:ext uri="{0D108BD9-81ED-4DB2-BD59-A6C34878D82A}">
+                    <a16:rowId xmlns:a16="http://schemas.microsoft.com/office/drawing/2014/main" val="933554769"/>
+                  </a:ext>
+                </a:extLst>
+              </a:tr>
+            </a:tbl>
+          </a:graphicData>
+        </a:graphic>
+      </p:graphicFrame>
+    </p:spTree>
+    <p:extLst>
+      <p:ext uri="{BB962C8B-B14F-4D97-AF65-F5344CB8AC3E}">
+        <p14:creationId xmlns:p14="http://schemas.microsoft.com/office/powerpoint/2010/main" val="749834321"/>
       </p:ext>
     </p:extLst>
   </p:cSld>

</xml_diff>